<commit_message>
feat: finish card recipe
</commit_message>
<xml_diff>
--- a/документы/ЗащитаУП.pptx
+++ b/документы/ЗащитаУП.pptx
@@ -4,6 +4,9 @@
   <p:sldMasterIdLst>
     <p:sldMasterId id="2147483648" r:id="rId1"/>
   </p:sldMasterIdLst>
+  <p:notesMasterIdLst>
+    <p:notesMasterId r:id="rId17"/>
+  </p:notesMasterIdLst>
   <p:sldIdLst>
     <p:sldId id="257" r:id="rId2"/>
     <p:sldId id="259" r:id="rId3"/>
@@ -11,13 +14,15 @@
     <p:sldId id="260" r:id="rId5"/>
     <p:sldId id="262" r:id="rId6"/>
     <p:sldId id="263" r:id="rId7"/>
-    <p:sldId id="264" r:id="rId8"/>
-    <p:sldId id="265" r:id="rId9"/>
-    <p:sldId id="268" r:id="rId10"/>
-    <p:sldId id="267" r:id="rId11"/>
-    <p:sldId id="270" r:id="rId12"/>
-    <p:sldId id="271" r:id="rId13"/>
-    <p:sldId id="272" r:id="rId14"/>
+    <p:sldId id="265" r:id="rId8"/>
+    <p:sldId id="268" r:id="rId9"/>
+    <p:sldId id="267" r:id="rId10"/>
+    <p:sldId id="270" r:id="rId11"/>
+    <p:sldId id="271" r:id="rId12"/>
+    <p:sldId id="272" r:id="rId13"/>
+    <p:sldId id="264" r:id="rId14"/>
+    <p:sldId id="273" r:id="rId15"/>
+    <p:sldId id="266" r:id="rId16"/>
   </p:sldIdLst>
   <p:sldSz cx="12192000" cy="6858000"/>
   <p:notesSz cx="6858000" cy="9144000"/>
@@ -132,6 +137,439 @@
 </p1510:revInfo>
 </file>
 
+<file path=ppt/notesMasters/notesMaster1.xml><?xml version="1.0" encoding="utf-8"?>
+<p:notesMaster xmlns:a="http://schemas.openxmlformats.org/drawingml/2006/main" xmlns:r="http://schemas.openxmlformats.org/officeDocument/2006/relationships" xmlns:p="http://schemas.openxmlformats.org/presentationml/2006/main">
+  <p:cSld>
+    <p:bg>
+      <p:bgRef idx="1001">
+        <a:schemeClr val="bg1"/>
+      </p:bgRef>
+    </p:bg>
+    <p:spTree>
+      <p:nvGrpSpPr>
+        <p:cNvPr id="1" name=""/>
+        <p:cNvGrpSpPr/>
+        <p:nvPr/>
+      </p:nvGrpSpPr>
+      <p:grpSpPr>
+        <a:xfrm>
+          <a:off x="0" y="0"/>
+          <a:ext cx="0" cy="0"/>
+          <a:chOff x="0" y="0"/>
+          <a:chExt cx="0" cy="0"/>
+        </a:xfrm>
+      </p:grpSpPr>
+      <p:sp>
+        <p:nvSpPr>
+          <p:cNvPr id="2" name="Верхний колонтитул 1"/>
+          <p:cNvSpPr>
+            <a:spLocks noGrp="1"/>
+          </p:cNvSpPr>
+          <p:nvPr>
+            <p:ph type="hdr" sz="quarter"/>
+          </p:nvPr>
+        </p:nvSpPr>
+        <p:spPr>
+          <a:xfrm>
+            <a:off x="0" y="0"/>
+            <a:ext cx="2971800" cy="458788"/>
+          </a:xfrm>
+          <a:prstGeom prst="rect">
+            <a:avLst/>
+          </a:prstGeom>
+        </p:spPr>
+        <p:txBody>
+          <a:bodyPr vert="horz" lIns="91440" tIns="45720" rIns="91440" bIns="45720" rtlCol="0"/>
+          <a:lstStyle>
+            <a:lvl1pPr algn="l">
+              <a:defRPr sz="1200"/>
+            </a:lvl1pPr>
+          </a:lstStyle>
+          <a:p>
+            <a:endParaRPr lang="ru-RU"/>
+          </a:p>
+        </p:txBody>
+      </p:sp>
+      <p:sp>
+        <p:nvSpPr>
+          <p:cNvPr id="3" name="Дата 2"/>
+          <p:cNvSpPr>
+            <a:spLocks noGrp="1"/>
+          </p:cNvSpPr>
+          <p:nvPr>
+            <p:ph type="dt" idx="1"/>
+          </p:nvPr>
+        </p:nvSpPr>
+        <p:spPr>
+          <a:xfrm>
+            <a:off x="3884613" y="0"/>
+            <a:ext cx="2971800" cy="458788"/>
+          </a:xfrm>
+          <a:prstGeom prst="rect">
+            <a:avLst/>
+          </a:prstGeom>
+        </p:spPr>
+        <p:txBody>
+          <a:bodyPr vert="horz" lIns="91440" tIns="45720" rIns="91440" bIns="45720" rtlCol="0"/>
+          <a:lstStyle>
+            <a:lvl1pPr algn="r">
+              <a:defRPr sz="1200"/>
+            </a:lvl1pPr>
+          </a:lstStyle>
+          <a:p>
+            <a:fld id="{5F7F35AE-5826-4457-B24A-19C705F098BE}" type="datetimeFigureOut">
+              <a:rPr lang="ru-RU" smtClean="0"/>
+              <a:t>05.06.2025</a:t>
+            </a:fld>
+            <a:endParaRPr lang="ru-RU"/>
+          </a:p>
+        </p:txBody>
+      </p:sp>
+      <p:sp>
+        <p:nvSpPr>
+          <p:cNvPr id="4" name="Образ слайда 3"/>
+          <p:cNvSpPr>
+            <a:spLocks noGrp="1" noRot="1" noChangeAspect="1"/>
+          </p:cNvSpPr>
+          <p:nvPr>
+            <p:ph type="sldImg" idx="2"/>
+          </p:nvPr>
+        </p:nvSpPr>
+        <p:spPr>
+          <a:xfrm>
+            <a:off x="685800" y="1143000"/>
+            <a:ext cx="5486400" cy="3086100"/>
+          </a:xfrm>
+          <a:prstGeom prst="rect">
+            <a:avLst/>
+          </a:prstGeom>
+          <a:noFill/>
+          <a:ln w="12700">
+            <a:solidFill>
+              <a:prstClr val="black"/>
+            </a:solidFill>
+          </a:ln>
+        </p:spPr>
+        <p:txBody>
+          <a:bodyPr vert="horz" lIns="91440" tIns="45720" rIns="91440" bIns="45720" rtlCol="0" anchor="ctr"/>
+          <a:lstStyle/>
+          <a:p>
+            <a:endParaRPr lang="ru-RU"/>
+          </a:p>
+        </p:txBody>
+      </p:sp>
+      <p:sp>
+        <p:nvSpPr>
+          <p:cNvPr id="5" name="Заметки 4"/>
+          <p:cNvSpPr>
+            <a:spLocks noGrp="1"/>
+          </p:cNvSpPr>
+          <p:nvPr>
+            <p:ph type="body" sz="quarter" idx="3"/>
+          </p:nvPr>
+        </p:nvSpPr>
+        <p:spPr>
+          <a:xfrm>
+            <a:off x="685800" y="4400550"/>
+            <a:ext cx="5486400" cy="3600450"/>
+          </a:xfrm>
+          <a:prstGeom prst="rect">
+            <a:avLst/>
+          </a:prstGeom>
+        </p:spPr>
+        <p:txBody>
+          <a:bodyPr vert="horz" lIns="91440" tIns="45720" rIns="91440" bIns="45720" rtlCol="0"/>
+          <a:lstStyle/>
+          <a:p>
+            <a:pPr lvl="0"/>
+            <a:r>
+              <a:rPr lang="ru-RU"/>
+              <a:t>Образец текста</a:t>
+            </a:r>
+          </a:p>
+          <a:p>
+            <a:pPr lvl="1"/>
+            <a:r>
+              <a:rPr lang="ru-RU"/>
+              <a:t>Второй уровень</a:t>
+            </a:r>
+          </a:p>
+          <a:p>
+            <a:pPr lvl="2"/>
+            <a:r>
+              <a:rPr lang="ru-RU"/>
+              <a:t>Третий уровень</a:t>
+            </a:r>
+          </a:p>
+          <a:p>
+            <a:pPr lvl="3"/>
+            <a:r>
+              <a:rPr lang="ru-RU"/>
+              <a:t>Четвертый уровень</a:t>
+            </a:r>
+          </a:p>
+          <a:p>
+            <a:pPr lvl="4"/>
+            <a:r>
+              <a:rPr lang="ru-RU"/>
+              <a:t>Пятый уровень</a:t>
+            </a:r>
+          </a:p>
+        </p:txBody>
+      </p:sp>
+      <p:sp>
+        <p:nvSpPr>
+          <p:cNvPr id="6" name="Нижний колонтитул 5"/>
+          <p:cNvSpPr>
+            <a:spLocks noGrp="1"/>
+          </p:cNvSpPr>
+          <p:nvPr>
+            <p:ph type="ftr" sz="quarter" idx="4"/>
+          </p:nvPr>
+        </p:nvSpPr>
+        <p:spPr>
+          <a:xfrm>
+            <a:off x="0" y="8685213"/>
+            <a:ext cx="2971800" cy="458787"/>
+          </a:xfrm>
+          <a:prstGeom prst="rect">
+            <a:avLst/>
+          </a:prstGeom>
+        </p:spPr>
+        <p:txBody>
+          <a:bodyPr vert="horz" lIns="91440" tIns="45720" rIns="91440" bIns="45720" rtlCol="0" anchor="b"/>
+          <a:lstStyle>
+            <a:lvl1pPr algn="l">
+              <a:defRPr sz="1200"/>
+            </a:lvl1pPr>
+          </a:lstStyle>
+          <a:p>
+            <a:endParaRPr lang="ru-RU"/>
+          </a:p>
+        </p:txBody>
+      </p:sp>
+      <p:sp>
+        <p:nvSpPr>
+          <p:cNvPr id="7" name="Номер слайда 6"/>
+          <p:cNvSpPr>
+            <a:spLocks noGrp="1"/>
+          </p:cNvSpPr>
+          <p:nvPr>
+            <p:ph type="sldNum" sz="quarter" idx="5"/>
+          </p:nvPr>
+        </p:nvSpPr>
+        <p:spPr>
+          <a:xfrm>
+            <a:off x="3884613" y="8685213"/>
+            <a:ext cx="2971800" cy="458787"/>
+          </a:xfrm>
+          <a:prstGeom prst="rect">
+            <a:avLst/>
+          </a:prstGeom>
+        </p:spPr>
+        <p:txBody>
+          <a:bodyPr vert="horz" lIns="91440" tIns="45720" rIns="91440" bIns="45720" rtlCol="0" anchor="b"/>
+          <a:lstStyle>
+            <a:lvl1pPr algn="r">
+              <a:defRPr sz="1200"/>
+            </a:lvl1pPr>
+          </a:lstStyle>
+          <a:p>
+            <a:fld id="{219F90D2-60C2-44BC-8039-AC2405A88F9D}" type="slidenum">
+              <a:rPr lang="ru-RU" smtClean="0"/>
+              <a:t>‹#›</a:t>
+            </a:fld>
+            <a:endParaRPr lang="ru-RU"/>
+          </a:p>
+        </p:txBody>
+      </p:sp>
+    </p:spTree>
+    <p:extLst>
+      <p:ext uri="{BB962C8B-B14F-4D97-AF65-F5344CB8AC3E}">
+        <p14:creationId xmlns:p14="http://schemas.microsoft.com/office/powerpoint/2010/main" val="2502509128"/>
+      </p:ext>
+    </p:extLst>
+  </p:cSld>
+  <p:clrMap bg1="lt1" tx1="dk1" bg2="lt2" tx2="dk2" accent1="accent1" accent2="accent2" accent3="accent3" accent4="accent4" accent5="accent5" accent6="accent6" hlink="hlink" folHlink="folHlink"/>
+  <p:notesStyle>
+    <a:lvl1pPr marL="0" algn="l" defTabSz="914400" rtl="0" eaLnBrk="1" latinLnBrk="0" hangingPunct="1">
+      <a:defRPr sz="1200" kern="1200">
+        <a:solidFill>
+          <a:schemeClr val="tx1"/>
+        </a:solidFill>
+        <a:latin typeface="+mn-lt"/>
+        <a:ea typeface="+mn-ea"/>
+        <a:cs typeface="+mn-cs"/>
+      </a:defRPr>
+    </a:lvl1pPr>
+    <a:lvl2pPr marL="457200" algn="l" defTabSz="914400" rtl="0" eaLnBrk="1" latinLnBrk="0" hangingPunct="1">
+      <a:defRPr sz="1200" kern="1200">
+        <a:solidFill>
+          <a:schemeClr val="tx1"/>
+        </a:solidFill>
+        <a:latin typeface="+mn-lt"/>
+        <a:ea typeface="+mn-ea"/>
+        <a:cs typeface="+mn-cs"/>
+      </a:defRPr>
+    </a:lvl2pPr>
+    <a:lvl3pPr marL="914400" algn="l" defTabSz="914400" rtl="0" eaLnBrk="1" latinLnBrk="0" hangingPunct="1">
+      <a:defRPr sz="1200" kern="1200">
+        <a:solidFill>
+          <a:schemeClr val="tx1"/>
+        </a:solidFill>
+        <a:latin typeface="+mn-lt"/>
+        <a:ea typeface="+mn-ea"/>
+        <a:cs typeface="+mn-cs"/>
+      </a:defRPr>
+    </a:lvl3pPr>
+    <a:lvl4pPr marL="1371600" algn="l" defTabSz="914400" rtl="0" eaLnBrk="1" latinLnBrk="0" hangingPunct="1">
+      <a:defRPr sz="1200" kern="1200">
+        <a:solidFill>
+          <a:schemeClr val="tx1"/>
+        </a:solidFill>
+        <a:latin typeface="+mn-lt"/>
+        <a:ea typeface="+mn-ea"/>
+        <a:cs typeface="+mn-cs"/>
+      </a:defRPr>
+    </a:lvl4pPr>
+    <a:lvl5pPr marL="1828800" algn="l" defTabSz="914400" rtl="0" eaLnBrk="1" latinLnBrk="0" hangingPunct="1">
+      <a:defRPr sz="1200" kern="1200">
+        <a:solidFill>
+          <a:schemeClr val="tx1"/>
+        </a:solidFill>
+        <a:latin typeface="+mn-lt"/>
+        <a:ea typeface="+mn-ea"/>
+        <a:cs typeface="+mn-cs"/>
+      </a:defRPr>
+    </a:lvl5pPr>
+    <a:lvl6pPr marL="2286000" algn="l" defTabSz="914400" rtl="0" eaLnBrk="1" latinLnBrk="0" hangingPunct="1">
+      <a:defRPr sz="1200" kern="1200">
+        <a:solidFill>
+          <a:schemeClr val="tx1"/>
+        </a:solidFill>
+        <a:latin typeface="+mn-lt"/>
+        <a:ea typeface="+mn-ea"/>
+        <a:cs typeface="+mn-cs"/>
+      </a:defRPr>
+    </a:lvl6pPr>
+    <a:lvl7pPr marL="2743200" algn="l" defTabSz="914400" rtl="0" eaLnBrk="1" latinLnBrk="0" hangingPunct="1">
+      <a:defRPr sz="1200" kern="1200">
+        <a:solidFill>
+          <a:schemeClr val="tx1"/>
+        </a:solidFill>
+        <a:latin typeface="+mn-lt"/>
+        <a:ea typeface="+mn-ea"/>
+        <a:cs typeface="+mn-cs"/>
+      </a:defRPr>
+    </a:lvl7pPr>
+    <a:lvl8pPr marL="3200400" algn="l" defTabSz="914400" rtl="0" eaLnBrk="1" latinLnBrk="0" hangingPunct="1">
+      <a:defRPr sz="1200" kern="1200">
+        <a:solidFill>
+          <a:schemeClr val="tx1"/>
+        </a:solidFill>
+        <a:latin typeface="+mn-lt"/>
+        <a:ea typeface="+mn-ea"/>
+        <a:cs typeface="+mn-cs"/>
+      </a:defRPr>
+    </a:lvl8pPr>
+    <a:lvl9pPr marL="3657600" algn="l" defTabSz="914400" rtl="0" eaLnBrk="1" latinLnBrk="0" hangingPunct="1">
+      <a:defRPr sz="1200" kern="1200">
+        <a:solidFill>
+          <a:schemeClr val="tx1"/>
+        </a:solidFill>
+        <a:latin typeface="+mn-lt"/>
+        <a:ea typeface="+mn-ea"/>
+        <a:cs typeface="+mn-cs"/>
+      </a:defRPr>
+    </a:lvl9pPr>
+  </p:notesStyle>
+</p:notesMaster>
+</file>
+
+<file path=ppt/notesSlides/notesSlide1.xml><?xml version="1.0" encoding="utf-8"?>
+<p:notes xmlns:a="http://schemas.openxmlformats.org/drawingml/2006/main" xmlns:r="http://schemas.openxmlformats.org/officeDocument/2006/relationships" xmlns:p="http://schemas.openxmlformats.org/presentationml/2006/main">
+  <p:cSld>
+    <p:spTree>
+      <p:nvGrpSpPr>
+        <p:cNvPr id="1" name=""/>
+        <p:cNvGrpSpPr/>
+        <p:nvPr/>
+      </p:nvGrpSpPr>
+      <p:grpSpPr>
+        <a:xfrm>
+          <a:off x="0" y="0"/>
+          <a:ext cx="0" cy="0"/>
+          <a:chOff x="0" y="0"/>
+          <a:chExt cx="0" cy="0"/>
+        </a:xfrm>
+      </p:grpSpPr>
+      <p:sp>
+        <p:nvSpPr>
+          <p:cNvPr id="2" name="Образ слайда 1"/>
+          <p:cNvSpPr>
+            <a:spLocks noGrp="1" noRot="1" noChangeAspect="1"/>
+          </p:cNvSpPr>
+          <p:nvPr>
+            <p:ph type="sldImg"/>
+          </p:nvPr>
+        </p:nvSpPr>
+        <p:spPr/>
+      </p:sp>
+      <p:sp>
+        <p:nvSpPr>
+          <p:cNvPr id="3" name="Заметки 2"/>
+          <p:cNvSpPr>
+            <a:spLocks noGrp="1"/>
+          </p:cNvSpPr>
+          <p:nvPr>
+            <p:ph type="body" idx="1"/>
+          </p:nvPr>
+        </p:nvSpPr>
+        <p:spPr/>
+        <p:txBody>
+          <a:bodyPr/>
+          <a:lstStyle/>
+          <a:p>
+            <a:endParaRPr lang="ru-RU" dirty="0"/>
+          </a:p>
+        </p:txBody>
+      </p:sp>
+      <p:sp>
+        <p:nvSpPr>
+          <p:cNvPr id="4" name="Номер слайда 3"/>
+          <p:cNvSpPr>
+            <a:spLocks noGrp="1"/>
+          </p:cNvSpPr>
+          <p:nvPr>
+            <p:ph type="sldNum" sz="quarter" idx="5"/>
+          </p:nvPr>
+        </p:nvSpPr>
+        <p:spPr/>
+        <p:txBody>
+          <a:bodyPr/>
+          <a:lstStyle/>
+          <a:p>
+            <a:fld id="{549F299E-BC29-4E8C-81AD-DAA5C8B84D4A}" type="slidenum">
+              <a:rPr lang="ru-RU" smtClean="0"/>
+              <a:t>13</a:t>
+            </a:fld>
+            <a:endParaRPr lang="ru-RU"/>
+          </a:p>
+        </p:txBody>
+      </p:sp>
+    </p:spTree>
+    <p:extLst>
+      <p:ext uri="{BB962C8B-B14F-4D97-AF65-F5344CB8AC3E}">
+        <p14:creationId xmlns:p14="http://schemas.microsoft.com/office/powerpoint/2010/main" val="3972558591"/>
+      </p:ext>
+    </p:extLst>
+  </p:cSld>
+  <p:clrMapOvr>
+    <a:masterClrMapping/>
+  </p:clrMapOvr>
+</p:notes>
+</file>
+
 <file path=ppt/slideLayouts/slideLayout1.xml><?xml version="1.0" encoding="utf-8"?>
 <p:sldLayout xmlns:a="http://schemas.openxmlformats.org/drawingml/2006/main" xmlns:r="http://schemas.openxmlformats.org/officeDocument/2006/relationships" xmlns:p="http://schemas.openxmlformats.org/presentationml/2006/main" type="title" preserve="1">
   <p:cSld name="Титульный слайд">
@@ -279,7 +717,7 @@
           <a:p>
             <a:fld id="{846093D9-F444-4FAD-BC44-82FCF8E2D7DB}" type="datetimeFigureOut">
               <a:rPr lang="ru-RU" smtClean="0"/>
-              <a:t>04.06.2025</a:t>
+              <a:t>05.06.2025</a:t>
             </a:fld>
             <a:endParaRPr lang="ru-RU"/>
           </a:p>
@@ -477,7 +915,7 @@
           <a:p>
             <a:fld id="{846093D9-F444-4FAD-BC44-82FCF8E2D7DB}" type="datetimeFigureOut">
               <a:rPr lang="ru-RU" smtClean="0"/>
-              <a:t>04.06.2025</a:t>
+              <a:t>05.06.2025</a:t>
             </a:fld>
             <a:endParaRPr lang="ru-RU"/>
           </a:p>
@@ -685,7 +1123,7 @@
           <a:p>
             <a:fld id="{846093D9-F444-4FAD-BC44-82FCF8E2D7DB}" type="datetimeFigureOut">
               <a:rPr lang="ru-RU" smtClean="0"/>
-              <a:t>04.06.2025</a:t>
+              <a:t>05.06.2025</a:t>
             </a:fld>
             <a:endParaRPr lang="ru-RU"/>
           </a:p>
@@ -883,7 +1321,7 @@
           <a:p>
             <a:fld id="{846093D9-F444-4FAD-BC44-82FCF8E2D7DB}" type="datetimeFigureOut">
               <a:rPr lang="ru-RU" smtClean="0"/>
-              <a:t>04.06.2025</a:t>
+              <a:t>05.06.2025</a:t>
             </a:fld>
             <a:endParaRPr lang="ru-RU"/>
           </a:p>
@@ -1158,7 +1596,7 @@
           <a:p>
             <a:fld id="{846093D9-F444-4FAD-BC44-82FCF8E2D7DB}" type="datetimeFigureOut">
               <a:rPr lang="ru-RU" smtClean="0"/>
-              <a:t>04.06.2025</a:t>
+              <a:t>05.06.2025</a:t>
             </a:fld>
             <a:endParaRPr lang="ru-RU"/>
           </a:p>
@@ -1423,7 +1861,7 @@
           <a:p>
             <a:fld id="{846093D9-F444-4FAD-BC44-82FCF8E2D7DB}" type="datetimeFigureOut">
               <a:rPr lang="ru-RU" smtClean="0"/>
-              <a:t>04.06.2025</a:t>
+              <a:t>05.06.2025</a:t>
             </a:fld>
             <a:endParaRPr lang="ru-RU"/>
           </a:p>
@@ -1835,7 +2273,7 @@
           <a:p>
             <a:fld id="{846093D9-F444-4FAD-BC44-82FCF8E2D7DB}" type="datetimeFigureOut">
               <a:rPr lang="ru-RU" smtClean="0"/>
-              <a:t>04.06.2025</a:t>
+              <a:t>05.06.2025</a:t>
             </a:fld>
             <a:endParaRPr lang="ru-RU"/>
           </a:p>
@@ -1976,7 +2414,7 @@
           <a:p>
             <a:fld id="{846093D9-F444-4FAD-BC44-82FCF8E2D7DB}" type="datetimeFigureOut">
               <a:rPr lang="ru-RU" smtClean="0"/>
-              <a:t>04.06.2025</a:t>
+              <a:t>05.06.2025</a:t>
             </a:fld>
             <a:endParaRPr lang="ru-RU"/>
           </a:p>
@@ -2089,7 +2527,7 @@
           <a:p>
             <a:fld id="{846093D9-F444-4FAD-BC44-82FCF8E2D7DB}" type="datetimeFigureOut">
               <a:rPr lang="ru-RU" smtClean="0"/>
-              <a:t>04.06.2025</a:t>
+              <a:t>05.06.2025</a:t>
             </a:fld>
             <a:endParaRPr lang="ru-RU"/>
           </a:p>
@@ -2400,7 +2838,7 @@
           <a:p>
             <a:fld id="{846093D9-F444-4FAD-BC44-82FCF8E2D7DB}" type="datetimeFigureOut">
               <a:rPr lang="ru-RU" smtClean="0"/>
-              <a:t>04.06.2025</a:t>
+              <a:t>05.06.2025</a:t>
             </a:fld>
             <a:endParaRPr lang="ru-RU"/>
           </a:p>
@@ -2688,7 +3126,7 @@
           <a:p>
             <a:fld id="{846093D9-F444-4FAD-BC44-82FCF8E2D7DB}" type="datetimeFigureOut">
               <a:rPr lang="ru-RU" smtClean="0"/>
-              <a:t>04.06.2025</a:t>
+              <a:t>05.06.2025</a:t>
             </a:fld>
             <a:endParaRPr lang="ru-RU"/>
           </a:p>
@@ -2929,7 +3367,7 @@
           <a:p>
             <a:fld id="{846093D9-F444-4FAD-BC44-82FCF8E2D7DB}" type="datetimeFigureOut">
               <a:rPr lang="ru-RU" smtClean="0"/>
-              <a:t>04.06.2025</a:t>
+              <a:t>05.06.2025</a:t>
             </a:fld>
             <a:endParaRPr lang="ru-RU"/>
           </a:p>
@@ -3828,7 +4266,7 @@
         <p:cNvPr id="1" name="">
           <a:extLst>
             <a:ext uri="{FF2B5EF4-FFF2-40B4-BE49-F238E27FC236}">
-              <a16:creationId xmlns:a16="http://schemas.microsoft.com/office/drawing/2014/main" id="{23FA106F-4F80-E868-99AA-BA824C5C49FD}"/>
+              <a16:creationId xmlns:a16="http://schemas.microsoft.com/office/drawing/2014/main" id="{C24AFF42-AC00-FA0F-4FA4-CB21C4B43F28}"/>
             </a:ext>
           </a:extLst>
         </p:cNvPr>
@@ -3848,7 +4286,7 @@
           <p:cNvPr id="2" name="Рамка 1">
             <a:extLst>
               <a:ext uri="{FF2B5EF4-FFF2-40B4-BE49-F238E27FC236}">
-                <a16:creationId xmlns:a16="http://schemas.microsoft.com/office/drawing/2014/main" id="{A5CF5D38-12D2-06CA-1246-67C1AE661BD6}"/>
+                <a16:creationId xmlns:a16="http://schemas.microsoft.com/office/drawing/2014/main" id="{26E1818D-2E7E-2509-0DC4-49BF8AB7C53B}"/>
               </a:ext>
             </a:extLst>
           </p:cNvPr>
@@ -3908,205 +4346,6 @@
           <p:cNvPr id="11" name="Заголовок 6">
             <a:extLst>
               <a:ext uri="{FF2B5EF4-FFF2-40B4-BE49-F238E27FC236}">
-                <a16:creationId xmlns:a16="http://schemas.microsoft.com/office/drawing/2014/main" id="{F53FFCB9-7C46-BB16-D2BF-A7B0E30614CB}"/>
-              </a:ext>
-            </a:extLst>
-          </p:cNvPr>
-          <p:cNvSpPr>
-            <a:spLocks noGrp="1"/>
-          </p:cNvSpPr>
-          <p:nvPr>
-            <p:ph type="title"/>
-          </p:nvPr>
-        </p:nvSpPr>
-        <p:spPr>
-          <a:xfrm>
-            <a:off x="2110000" y="475816"/>
-            <a:ext cx="7972000" cy="634082"/>
-          </a:xfrm>
-        </p:spPr>
-        <p:txBody>
-          <a:bodyPr vert="horz" lIns="91440" tIns="45720" rIns="91440" bIns="45720" rtlCol="0" anchor="ctr">
-            <a:normAutofit/>
-          </a:bodyPr>
-          <a:lstStyle/>
-          <a:p>
-            <a:pPr algn="ctr"/>
-            <a:r>
-              <a:rPr lang="ru-RU" sz="3200" b="1" dirty="0">
-                <a:solidFill>
-                  <a:srgbClr val="9B2D1F"/>
-                </a:solidFill>
-                <a:latin typeface="Arial"/>
-                <a:cs typeface="Arial"/>
-              </a:rPr>
-              <a:t>ВЕРСТКА ПРОФИЛЯ</a:t>
-            </a:r>
-            <a:endParaRPr lang="ru-RU"/>
-          </a:p>
-        </p:txBody>
-      </p:sp>
-      <p:pic>
-        <p:nvPicPr>
-          <p:cNvPr id="3" name="Рисунок 2" descr="Изображение выглядит как текст, снимок экрана&#10;&#10;Содержимое, созданное искусственным интеллектом, может быть неверным.">
-            <a:extLst>
-              <a:ext uri="{FF2B5EF4-FFF2-40B4-BE49-F238E27FC236}">
-                <a16:creationId xmlns:a16="http://schemas.microsoft.com/office/drawing/2014/main" id="{19088A25-7D79-B5F5-669F-CB80BE7B03B7}"/>
-              </a:ext>
-            </a:extLst>
-          </p:cNvPr>
-          <p:cNvPicPr>
-            <a:picLocks noChangeAspect="1"/>
-          </p:cNvPicPr>
-          <p:nvPr/>
-        </p:nvPicPr>
-        <p:blipFill>
-          <a:blip r:embed="rId2"/>
-          <a:stretch>
-            <a:fillRect/>
-          </a:stretch>
-        </p:blipFill>
-        <p:spPr>
-          <a:xfrm>
-            <a:off x="954196" y="1712478"/>
-            <a:ext cx="5137498" cy="3767073"/>
-          </a:xfrm>
-          <a:prstGeom prst="rect">
-            <a:avLst/>
-          </a:prstGeom>
-        </p:spPr>
-      </p:pic>
-      <p:pic>
-        <p:nvPicPr>
-          <p:cNvPr id="6" name="Рисунок 5" descr="Изображение выглядит как текст, снимок экрана&#10;&#10;Содержимое, созданное искусственным интеллектом, может быть неверным.">
-            <a:extLst>
-              <a:ext uri="{FF2B5EF4-FFF2-40B4-BE49-F238E27FC236}">
-                <a16:creationId xmlns:a16="http://schemas.microsoft.com/office/drawing/2014/main" id="{6B5779B6-A723-B929-5FCA-C9B0C421A88A}"/>
-              </a:ext>
-            </a:extLst>
-          </p:cNvPr>
-          <p:cNvPicPr>
-            <a:picLocks noChangeAspect="1"/>
-          </p:cNvPicPr>
-          <p:nvPr/>
-        </p:nvPicPr>
-        <p:blipFill>
-          <a:blip r:embed="rId3"/>
-          <a:stretch>
-            <a:fillRect/>
-          </a:stretch>
-        </p:blipFill>
-        <p:spPr>
-          <a:xfrm>
-            <a:off x="6276518" y="1416029"/>
-            <a:ext cx="5588827" cy="4359971"/>
-          </a:xfrm>
-          <a:prstGeom prst="rect">
-            <a:avLst/>
-          </a:prstGeom>
-        </p:spPr>
-      </p:pic>
-    </p:spTree>
-    <p:extLst>
-      <p:ext uri="{BB962C8B-B14F-4D97-AF65-F5344CB8AC3E}">
-        <p14:creationId xmlns:p14="http://schemas.microsoft.com/office/powerpoint/2010/main" val="3925909502"/>
-      </p:ext>
-    </p:extLst>
-  </p:cSld>
-  <p:clrMapOvr>
-    <a:masterClrMapping/>
-  </p:clrMapOvr>
-</p:sld>
-</file>
-
-<file path=ppt/slides/slide11.xml><?xml version="1.0" encoding="utf-8"?>
-<p:sld xmlns:a="http://schemas.openxmlformats.org/drawingml/2006/main" xmlns:r="http://schemas.openxmlformats.org/officeDocument/2006/relationships" xmlns:p="http://schemas.openxmlformats.org/presentationml/2006/main">
-  <p:cSld>
-    <p:spTree>
-      <p:nvGrpSpPr>
-        <p:cNvPr id="1" name="">
-          <a:extLst>
-            <a:ext uri="{FF2B5EF4-FFF2-40B4-BE49-F238E27FC236}">
-              <a16:creationId xmlns:a16="http://schemas.microsoft.com/office/drawing/2014/main" id="{C24AFF42-AC00-FA0F-4FA4-CB21C4B43F28}"/>
-            </a:ext>
-          </a:extLst>
-        </p:cNvPr>
-        <p:cNvGrpSpPr/>
-        <p:nvPr/>
-      </p:nvGrpSpPr>
-      <p:grpSpPr>
-        <a:xfrm>
-          <a:off x="0" y="0"/>
-          <a:ext cx="0" cy="0"/>
-          <a:chOff x="0" y="0"/>
-          <a:chExt cx="0" cy="0"/>
-        </a:xfrm>
-      </p:grpSpPr>
-      <p:sp>
-        <p:nvSpPr>
-          <p:cNvPr id="2" name="Рамка 1">
-            <a:extLst>
-              <a:ext uri="{FF2B5EF4-FFF2-40B4-BE49-F238E27FC236}">
-                <a16:creationId xmlns:a16="http://schemas.microsoft.com/office/drawing/2014/main" id="{26E1818D-2E7E-2509-0DC4-49BF8AB7C53B}"/>
-              </a:ext>
-            </a:extLst>
-          </p:cNvPr>
-          <p:cNvSpPr/>
-          <p:nvPr/>
-        </p:nvSpPr>
-        <p:spPr>
-          <a:xfrm>
-            <a:off x="0" y="0"/>
-            <a:ext cx="12192000" cy="6858000"/>
-          </a:xfrm>
-          <a:prstGeom prst="frame">
-            <a:avLst>
-              <a:gd name="adj1" fmla="val 2233"/>
-            </a:avLst>
-          </a:prstGeom>
-          <a:solidFill>
-            <a:srgbClr val="9B2D1F"/>
-          </a:solidFill>
-          <a:ln>
-            <a:solidFill>
-              <a:srgbClr val="9B2D1F"/>
-            </a:solidFill>
-          </a:ln>
-        </p:spPr>
-        <p:style>
-          <a:lnRef idx="2">
-            <a:schemeClr val="accent1">
-              <a:shade val="15000"/>
-            </a:schemeClr>
-          </a:lnRef>
-          <a:fillRef idx="1">
-            <a:schemeClr val="accent1"/>
-          </a:fillRef>
-          <a:effectRef idx="0">
-            <a:schemeClr val="accent1"/>
-          </a:effectRef>
-          <a:fontRef idx="minor">
-            <a:schemeClr val="lt1"/>
-          </a:fontRef>
-        </p:style>
-        <p:txBody>
-          <a:bodyPr rtlCol="0" anchor="ctr"/>
-          <a:lstStyle/>
-          <a:p>
-            <a:pPr algn="ctr"/>
-            <a:endParaRPr lang="ru-RU">
-              <a:solidFill>
-                <a:schemeClr val="tx1"/>
-              </a:solidFill>
-            </a:endParaRPr>
-          </a:p>
-        </p:txBody>
-      </p:sp>
-      <p:sp>
-        <p:nvSpPr>
-          <p:cNvPr id="11" name="Заголовок 6">
-            <a:extLst>
-              <a:ext uri="{FF2B5EF4-FFF2-40B4-BE49-F238E27FC236}">
                 <a16:creationId xmlns:a16="http://schemas.microsoft.com/office/drawing/2014/main" id="{829483EA-8117-E717-5FA0-73E43AD38B9C}"/>
               </a:ext>
             </a:extLst>
@@ -4301,7 +4540,7 @@
 </p:sld>
 </file>
 
-<file path=ppt/slides/slide12.xml><?xml version="1.0" encoding="utf-8"?>
+<file path=ppt/slides/slide11.xml><?xml version="1.0" encoding="utf-8"?>
 <p:sld xmlns:a="http://schemas.openxmlformats.org/drawingml/2006/main" xmlns:r="http://schemas.openxmlformats.org/officeDocument/2006/relationships" xmlns:p="http://schemas.openxmlformats.org/presentationml/2006/main">
   <p:cSld>
     <p:spTree>
@@ -4549,7 +4788,7 @@
 </p:sld>
 </file>
 
-<file path=ppt/slides/slide13.xml><?xml version="1.0" encoding="utf-8"?>
+<file path=ppt/slides/slide12.xml><?xml version="1.0" encoding="utf-8"?>
 <p:sld xmlns:a="http://schemas.openxmlformats.org/drawingml/2006/main" xmlns:r="http://schemas.openxmlformats.org/officeDocument/2006/relationships" xmlns:p="http://schemas.openxmlformats.org/presentationml/2006/main">
   <p:cSld>
     <p:spTree>
@@ -4769,6 +5008,1129 @@
     <p:extLst>
       <p:ext uri="{BB962C8B-B14F-4D97-AF65-F5344CB8AC3E}">
         <p14:creationId xmlns:p14="http://schemas.microsoft.com/office/powerpoint/2010/main" val="2061596081"/>
+      </p:ext>
+    </p:extLst>
+  </p:cSld>
+  <p:clrMapOvr>
+    <a:masterClrMapping/>
+  </p:clrMapOvr>
+</p:sld>
+</file>
+
+<file path=ppt/slides/slide13.xml><?xml version="1.0" encoding="utf-8"?>
+<p:sld xmlns:a="http://schemas.openxmlformats.org/drawingml/2006/main" xmlns:r="http://schemas.openxmlformats.org/officeDocument/2006/relationships" xmlns:p="http://schemas.openxmlformats.org/presentationml/2006/main">
+  <p:cSld>
+    <p:spTree>
+      <p:nvGrpSpPr>
+        <p:cNvPr id="1" name="">
+          <a:extLst>
+            <a:ext uri="{FF2B5EF4-FFF2-40B4-BE49-F238E27FC236}">
+              <a16:creationId xmlns:a16="http://schemas.microsoft.com/office/drawing/2014/main" id="{D17A73DB-1D6B-E53B-88EF-735F17FFB703}"/>
+            </a:ext>
+          </a:extLst>
+        </p:cNvPr>
+        <p:cNvGrpSpPr/>
+        <p:nvPr/>
+      </p:nvGrpSpPr>
+      <p:grpSpPr>
+        <a:xfrm>
+          <a:off x="0" y="0"/>
+          <a:ext cx="0" cy="0"/>
+          <a:chOff x="0" y="0"/>
+          <a:chExt cx="0" cy="0"/>
+        </a:xfrm>
+      </p:grpSpPr>
+      <p:sp>
+        <p:nvSpPr>
+          <p:cNvPr id="2" name="Рамка 1">
+            <a:extLst>
+              <a:ext uri="{FF2B5EF4-FFF2-40B4-BE49-F238E27FC236}">
+                <a16:creationId xmlns:a16="http://schemas.microsoft.com/office/drawing/2014/main" id="{E445C8AA-A29F-1A51-A57D-A3E265D4FFC5}"/>
+              </a:ext>
+            </a:extLst>
+          </p:cNvPr>
+          <p:cNvSpPr/>
+          <p:nvPr/>
+        </p:nvSpPr>
+        <p:spPr>
+          <a:xfrm>
+            <a:off x="0" y="0"/>
+            <a:ext cx="12192000" cy="6858000"/>
+          </a:xfrm>
+          <a:prstGeom prst="frame">
+            <a:avLst>
+              <a:gd name="adj1" fmla="val 2233"/>
+            </a:avLst>
+          </a:prstGeom>
+          <a:solidFill>
+            <a:srgbClr val="9B2D1F"/>
+          </a:solidFill>
+          <a:ln>
+            <a:solidFill>
+              <a:srgbClr val="9B2D1F"/>
+            </a:solidFill>
+          </a:ln>
+        </p:spPr>
+        <p:style>
+          <a:lnRef idx="2">
+            <a:schemeClr val="accent1">
+              <a:shade val="15000"/>
+            </a:schemeClr>
+          </a:lnRef>
+          <a:fillRef idx="1">
+            <a:schemeClr val="accent1"/>
+          </a:fillRef>
+          <a:effectRef idx="0">
+            <a:schemeClr val="accent1"/>
+          </a:effectRef>
+          <a:fontRef idx="minor">
+            <a:schemeClr val="lt1"/>
+          </a:fontRef>
+        </p:style>
+        <p:txBody>
+          <a:bodyPr rtlCol="0" anchor="ctr"/>
+          <a:lstStyle/>
+          <a:p>
+            <a:pPr algn="ctr"/>
+            <a:endParaRPr lang="ru-RU">
+              <a:solidFill>
+                <a:schemeClr val="tx1"/>
+              </a:solidFill>
+            </a:endParaRPr>
+          </a:p>
+        </p:txBody>
+      </p:sp>
+      <p:sp>
+        <p:nvSpPr>
+          <p:cNvPr id="11" name="Заголовок 6">
+            <a:extLst>
+              <a:ext uri="{FF2B5EF4-FFF2-40B4-BE49-F238E27FC236}">
+                <a16:creationId xmlns:a16="http://schemas.microsoft.com/office/drawing/2014/main" id="{BA365844-923A-D917-776C-D7484F1F6ECC}"/>
+              </a:ext>
+            </a:extLst>
+          </p:cNvPr>
+          <p:cNvSpPr>
+            <a:spLocks noGrp="1"/>
+          </p:cNvSpPr>
+          <p:nvPr>
+            <p:ph type="title"/>
+          </p:nvPr>
+        </p:nvSpPr>
+        <p:spPr>
+          <a:xfrm>
+            <a:off x="4755272" y="306448"/>
+            <a:ext cx="3376400" cy="634082"/>
+          </a:xfrm>
+        </p:spPr>
+        <p:txBody>
+          <a:bodyPr vert="horz" lIns="91440" tIns="45720" rIns="91440" bIns="45720" rtlCol="0" anchor="ctr">
+            <a:normAutofit/>
+          </a:bodyPr>
+          <a:lstStyle/>
+          <a:p>
+            <a:r>
+              <a:rPr lang="ru-RU" sz="3200" b="1" dirty="0">
+                <a:solidFill>
+                  <a:srgbClr val="9B2D1F"/>
+                </a:solidFill>
+                <a:latin typeface="Arial" panose="020B0604020202020204" pitchFamily="34" charset="0"/>
+                <a:cs typeface="Arial" panose="020B0604020202020204" pitchFamily="34" charset="0"/>
+              </a:rPr>
+              <a:t>КОД ПРЮФЕРА</a:t>
+            </a:r>
+          </a:p>
+        </p:txBody>
+      </p:sp>
+      <p:sp>
+        <p:nvSpPr>
+          <p:cNvPr id="4" name="TextBox 3">
+            <a:extLst>
+              <a:ext uri="{FF2B5EF4-FFF2-40B4-BE49-F238E27FC236}">
+                <a16:creationId xmlns:a16="http://schemas.microsoft.com/office/drawing/2014/main" id="{D5C60369-45CE-2446-A65E-1911A3907ADB}"/>
+              </a:ext>
+            </a:extLst>
+          </p:cNvPr>
+          <p:cNvSpPr txBox="1"/>
+          <p:nvPr/>
+        </p:nvSpPr>
+        <p:spPr>
+          <a:xfrm>
+            <a:off x="403860" y="1464097"/>
+            <a:ext cx="5692140" cy="4796185"/>
+          </a:xfrm>
+          <a:prstGeom prst="rect">
+            <a:avLst/>
+          </a:prstGeom>
+          <a:noFill/>
+        </p:spPr>
+        <p:txBody>
+          <a:bodyPr wrap="square">
+            <a:spAutoFit/>
+          </a:bodyPr>
+          <a:lstStyle/>
+          <a:p>
+            <a:pPr indent="450215" algn="just">
+              <a:buNone/>
+            </a:pPr>
+            <a:r>
+              <a:rPr lang="ru-RU" sz="1800" b="1" dirty="0">
+                <a:effectLst/>
+                <a:latin typeface="Arial" panose="020B0604020202020204" pitchFamily="34" charset="0"/>
+                <a:ea typeface="Calibri" panose="020F0502020204030204" pitchFamily="34" charset="0"/>
+                <a:cs typeface="Arial" panose="020B0604020202020204" pitchFamily="34" charset="0"/>
+              </a:rPr>
+              <a:t>Что делает: </a:t>
+            </a:r>
+            <a:r>
+              <a:rPr lang="ru-RU" sz="1800" dirty="0">
+                <a:effectLst/>
+                <a:latin typeface="Arial" panose="020B0604020202020204" pitchFamily="34" charset="0"/>
+                <a:ea typeface="Calibri" panose="020F0502020204030204" pitchFamily="34" charset="0"/>
+                <a:cs typeface="Arial" panose="020B0604020202020204" pitchFamily="34" charset="0"/>
+              </a:rPr>
+              <a:t>преобразует дерево (заданное списком рёбер) в уникальную числовую последовательность.</a:t>
+            </a:r>
+          </a:p>
+          <a:p>
+            <a:pPr indent="450215" algn="just">
+              <a:lnSpc>
+                <a:spcPct val="150000"/>
+              </a:lnSpc>
+              <a:buNone/>
+            </a:pPr>
+            <a:endParaRPr lang="ru-RU" sz="1800" dirty="0">
+              <a:effectLst/>
+              <a:latin typeface="Arial" panose="020B0604020202020204" pitchFamily="34" charset="0"/>
+              <a:ea typeface="Calibri" panose="020F0502020204030204" pitchFamily="34" charset="0"/>
+              <a:cs typeface="Arial" panose="020B0604020202020204" pitchFamily="34" charset="0"/>
+            </a:endParaRPr>
+          </a:p>
+          <a:p>
+            <a:pPr indent="450215" algn="just">
+              <a:lnSpc>
+                <a:spcPct val="150000"/>
+              </a:lnSpc>
+              <a:buNone/>
+            </a:pPr>
+            <a:r>
+              <a:rPr lang="ru-RU" sz="1800" b="1" dirty="0">
+                <a:effectLst/>
+                <a:latin typeface="Arial" panose="020B0604020202020204" pitchFamily="34" charset="0"/>
+                <a:ea typeface="Calibri" panose="020F0502020204030204" pitchFamily="34" charset="0"/>
+                <a:cs typeface="Arial" panose="020B0604020202020204" pitchFamily="34" charset="0"/>
+              </a:rPr>
+              <a:t>Как работает:</a:t>
+            </a:r>
+          </a:p>
+          <a:p>
+            <a:pPr indent="450215" algn="just">
+              <a:lnSpc>
+                <a:spcPct val="150000"/>
+              </a:lnSpc>
+              <a:buNone/>
+            </a:pPr>
+            <a:endParaRPr lang="ru-RU" sz="1800" dirty="0">
+              <a:effectLst/>
+              <a:latin typeface="Arial" panose="020B0604020202020204" pitchFamily="34" charset="0"/>
+              <a:ea typeface="Calibri" panose="020F0502020204030204" pitchFamily="34" charset="0"/>
+              <a:cs typeface="Arial" panose="020B0604020202020204" pitchFamily="34" charset="0"/>
+            </a:endParaRPr>
+          </a:p>
+          <a:p>
+            <a:pPr marL="342900" lvl="0" indent="-342900" algn="l">
+              <a:spcAft>
+                <a:spcPts val="800"/>
+              </a:spcAft>
+              <a:buSzPts val="1400"/>
+              <a:buFont typeface="+mj-lt"/>
+              <a:buAutoNum type="arabicPeriod"/>
+              <a:tabLst>
+                <a:tab pos="457200" algn="l"/>
+              </a:tabLst>
+            </a:pPr>
+            <a:r>
+              <a:rPr lang="ru-RU" sz="1800" dirty="0">
+                <a:effectLst/>
+                <a:latin typeface="Arial" panose="020B0604020202020204" pitchFamily="34" charset="0"/>
+                <a:ea typeface="Calibri" panose="020F0502020204030204" pitchFamily="34" charset="0"/>
+                <a:cs typeface="Arial" panose="020B0604020202020204" pitchFamily="34" charset="0"/>
+              </a:rPr>
+              <a:t>Строит список смежности дерева (для каждой вершины хранит список соседей).</a:t>
+            </a:r>
+          </a:p>
+          <a:p>
+            <a:pPr marL="342900" lvl="0" indent="-342900" algn="l">
+              <a:spcAft>
+                <a:spcPts val="800"/>
+              </a:spcAft>
+              <a:buSzPts val="1400"/>
+              <a:buFont typeface="+mj-lt"/>
+              <a:buAutoNum type="arabicPeriod"/>
+              <a:tabLst>
+                <a:tab pos="457200" algn="l"/>
+              </a:tabLst>
+            </a:pPr>
+            <a:r>
+              <a:rPr lang="ru-RU" sz="1800" dirty="0">
+                <a:effectLst/>
+                <a:latin typeface="Arial" panose="020B0604020202020204" pitchFamily="34" charset="0"/>
+                <a:ea typeface="Calibri" panose="020F0502020204030204" pitchFamily="34" charset="0"/>
+                <a:cs typeface="Arial" panose="020B0604020202020204" pitchFamily="34" charset="0"/>
+              </a:rPr>
+              <a:t>На каждом шаге находит лист с минимальным номером (вершину с одной связью).</a:t>
+            </a:r>
+          </a:p>
+          <a:p>
+            <a:pPr marL="342900" lvl="0" indent="-342900" algn="l">
+              <a:spcAft>
+                <a:spcPts val="800"/>
+              </a:spcAft>
+              <a:buSzPts val="1400"/>
+              <a:buFont typeface="+mj-lt"/>
+              <a:buAutoNum type="arabicPeriod"/>
+              <a:tabLst>
+                <a:tab pos="457200" algn="l"/>
+              </a:tabLst>
+            </a:pPr>
+            <a:r>
+              <a:rPr lang="ru-RU" sz="1800" dirty="0">
+                <a:effectLst/>
+                <a:latin typeface="Arial" panose="020B0604020202020204" pitchFamily="34" charset="0"/>
+                <a:ea typeface="Calibri" panose="020F0502020204030204" pitchFamily="34" charset="0"/>
+                <a:cs typeface="Arial" panose="020B0604020202020204" pitchFamily="34" charset="0"/>
+              </a:rPr>
+              <a:t>Добавляет в код </a:t>
+            </a:r>
+            <a:r>
+              <a:rPr lang="ru-RU" sz="1800" dirty="0" err="1">
+                <a:effectLst/>
+                <a:latin typeface="Arial" panose="020B0604020202020204" pitchFamily="34" charset="0"/>
+                <a:ea typeface="Calibri" panose="020F0502020204030204" pitchFamily="34" charset="0"/>
+                <a:cs typeface="Arial" panose="020B0604020202020204" pitchFamily="34" charset="0"/>
+              </a:rPr>
+              <a:t>Прюфера</a:t>
+            </a:r>
+            <a:r>
+              <a:rPr lang="ru-RU" sz="1800" dirty="0">
+                <a:effectLst/>
+                <a:latin typeface="Arial" panose="020B0604020202020204" pitchFamily="34" charset="0"/>
+                <a:ea typeface="Calibri" panose="020F0502020204030204" pitchFamily="34" charset="0"/>
+                <a:cs typeface="Arial" panose="020B0604020202020204" pitchFamily="34" charset="0"/>
+              </a:rPr>
+              <a:t> номер соседа этого листа.</a:t>
+            </a:r>
+          </a:p>
+          <a:p>
+            <a:pPr marL="342900" lvl="0" indent="-342900" algn="l">
+              <a:spcAft>
+                <a:spcPts val="800"/>
+              </a:spcAft>
+              <a:buSzPts val="1400"/>
+              <a:buFont typeface="+mj-lt"/>
+              <a:buAutoNum type="arabicPeriod"/>
+              <a:tabLst>
+                <a:tab pos="457200" algn="l"/>
+              </a:tabLst>
+            </a:pPr>
+            <a:r>
+              <a:rPr lang="ru-RU" sz="1800" dirty="0">
+                <a:effectLst/>
+                <a:latin typeface="Arial" panose="020B0604020202020204" pitchFamily="34" charset="0"/>
+                <a:ea typeface="Calibri" panose="020F0502020204030204" pitchFamily="34" charset="0"/>
+                <a:cs typeface="Arial" panose="020B0604020202020204" pitchFamily="34" charset="0"/>
+              </a:rPr>
+              <a:t>Удаляет лист из дерева.</a:t>
+            </a:r>
+          </a:p>
+          <a:p>
+            <a:pPr marL="342900" lvl="0" indent="-342900" algn="l">
+              <a:buSzPts val="1400"/>
+              <a:buFont typeface="+mj-lt"/>
+              <a:buAutoNum type="arabicPeriod"/>
+              <a:tabLst>
+                <a:tab pos="457200" algn="l"/>
+              </a:tabLst>
+            </a:pPr>
+            <a:r>
+              <a:rPr lang="ru-RU" sz="1800" dirty="0">
+                <a:effectLst/>
+                <a:latin typeface="Arial" panose="020B0604020202020204" pitchFamily="34" charset="0"/>
+                <a:ea typeface="Calibri" panose="020F0502020204030204" pitchFamily="34" charset="0"/>
+                <a:cs typeface="Arial" panose="020B0604020202020204" pitchFamily="34" charset="0"/>
+              </a:rPr>
+              <a:t>Повторяет, пока не останется 2 вершины.</a:t>
+            </a:r>
+          </a:p>
+        </p:txBody>
+      </p:sp>
+      <p:sp>
+        <p:nvSpPr>
+          <p:cNvPr id="6" name="TextBox 5">
+            <a:extLst>
+              <a:ext uri="{FF2B5EF4-FFF2-40B4-BE49-F238E27FC236}">
+                <a16:creationId xmlns:a16="http://schemas.microsoft.com/office/drawing/2014/main" id="{248B752C-B781-9003-6825-A0D6FF78B027}"/>
+              </a:ext>
+            </a:extLst>
+          </p:cNvPr>
+          <p:cNvSpPr txBox="1"/>
+          <p:nvPr/>
+        </p:nvSpPr>
+        <p:spPr>
+          <a:xfrm>
+            <a:off x="1393698" y="940529"/>
+            <a:ext cx="3712464" cy="456535"/>
+          </a:xfrm>
+          <a:prstGeom prst="rect">
+            <a:avLst/>
+          </a:prstGeom>
+          <a:noFill/>
+        </p:spPr>
+        <p:txBody>
+          <a:bodyPr wrap="square">
+            <a:spAutoFit/>
+          </a:bodyPr>
+          <a:lstStyle/>
+          <a:p>
+            <a:pPr indent="450215" algn="just">
+              <a:lnSpc>
+                <a:spcPct val="150000"/>
+              </a:lnSpc>
+              <a:buNone/>
+            </a:pPr>
+            <a:r>
+              <a:rPr lang="ru-RU" sz="1800" b="1" dirty="0">
+                <a:effectLst/>
+                <a:latin typeface="Arial" panose="020B0604020202020204" pitchFamily="34" charset="0"/>
+                <a:ea typeface="Calibri" panose="020F0502020204030204" pitchFamily="34" charset="0"/>
+                <a:cs typeface="Arial" panose="020B0604020202020204" pitchFamily="34" charset="0"/>
+              </a:rPr>
+              <a:t>Кодирование </a:t>
+            </a:r>
+            <a:r>
+              <a:rPr lang="ru-RU" sz="1800" b="1" dirty="0" err="1">
+                <a:effectLst/>
+                <a:latin typeface="Arial" panose="020B0604020202020204" pitchFamily="34" charset="0"/>
+                <a:ea typeface="Calibri" panose="020F0502020204030204" pitchFamily="34" charset="0"/>
+                <a:cs typeface="Arial" panose="020B0604020202020204" pitchFamily="34" charset="0"/>
+              </a:rPr>
+              <a:t>Прюфера</a:t>
+            </a:r>
+            <a:endParaRPr lang="ru-RU" sz="1800" b="1" dirty="0">
+              <a:effectLst/>
+              <a:latin typeface="Arial" panose="020B0604020202020204" pitchFamily="34" charset="0"/>
+              <a:ea typeface="Calibri" panose="020F0502020204030204" pitchFamily="34" charset="0"/>
+              <a:cs typeface="Arial" panose="020B0604020202020204" pitchFamily="34" charset="0"/>
+            </a:endParaRPr>
+          </a:p>
+        </p:txBody>
+      </p:sp>
+      <p:sp>
+        <p:nvSpPr>
+          <p:cNvPr id="7" name="TextBox 6">
+            <a:extLst>
+              <a:ext uri="{FF2B5EF4-FFF2-40B4-BE49-F238E27FC236}">
+                <a16:creationId xmlns:a16="http://schemas.microsoft.com/office/drawing/2014/main" id="{E69BB9E7-04E2-66AA-502D-0EE075162807}"/>
+              </a:ext>
+            </a:extLst>
+          </p:cNvPr>
+          <p:cNvSpPr txBox="1"/>
+          <p:nvPr/>
+        </p:nvSpPr>
+        <p:spPr>
+          <a:xfrm>
+            <a:off x="7516368" y="957514"/>
+            <a:ext cx="3712464" cy="456535"/>
+          </a:xfrm>
+          <a:prstGeom prst="rect">
+            <a:avLst/>
+          </a:prstGeom>
+          <a:noFill/>
+        </p:spPr>
+        <p:txBody>
+          <a:bodyPr wrap="square">
+            <a:spAutoFit/>
+          </a:bodyPr>
+          <a:lstStyle/>
+          <a:p>
+            <a:pPr indent="450215" algn="just">
+              <a:lnSpc>
+                <a:spcPct val="150000"/>
+              </a:lnSpc>
+              <a:buNone/>
+            </a:pPr>
+            <a:r>
+              <a:rPr lang="ru-RU" sz="1800" b="1" dirty="0">
+                <a:effectLst/>
+                <a:latin typeface="Arial" panose="020B0604020202020204" pitchFamily="34" charset="0"/>
+                <a:ea typeface="Calibri" panose="020F0502020204030204" pitchFamily="34" charset="0"/>
+                <a:cs typeface="Arial" panose="020B0604020202020204" pitchFamily="34" charset="0"/>
+              </a:rPr>
+              <a:t>Декодирование </a:t>
+            </a:r>
+            <a:r>
+              <a:rPr lang="ru-RU" sz="1800" b="1" dirty="0" err="1">
+                <a:effectLst/>
+                <a:latin typeface="Arial" panose="020B0604020202020204" pitchFamily="34" charset="0"/>
+                <a:ea typeface="Calibri" panose="020F0502020204030204" pitchFamily="34" charset="0"/>
+                <a:cs typeface="Arial" panose="020B0604020202020204" pitchFamily="34" charset="0"/>
+              </a:rPr>
+              <a:t>Прюфера</a:t>
+            </a:r>
+            <a:endParaRPr lang="ru-RU" sz="1800" b="1" dirty="0">
+              <a:effectLst/>
+              <a:latin typeface="Arial" panose="020B0604020202020204" pitchFamily="34" charset="0"/>
+              <a:ea typeface="Calibri" panose="020F0502020204030204" pitchFamily="34" charset="0"/>
+              <a:cs typeface="Arial" panose="020B0604020202020204" pitchFamily="34" charset="0"/>
+            </a:endParaRPr>
+          </a:p>
+        </p:txBody>
+      </p:sp>
+      <p:sp>
+        <p:nvSpPr>
+          <p:cNvPr id="9" name="TextBox 8">
+            <a:extLst>
+              <a:ext uri="{FF2B5EF4-FFF2-40B4-BE49-F238E27FC236}">
+                <a16:creationId xmlns:a16="http://schemas.microsoft.com/office/drawing/2014/main" id="{CFF4D343-83E3-8ADA-2E9B-C7D33A5963F1}"/>
+              </a:ext>
+            </a:extLst>
+          </p:cNvPr>
+          <p:cNvSpPr txBox="1"/>
+          <p:nvPr/>
+        </p:nvSpPr>
+        <p:spPr>
+          <a:xfrm>
+            <a:off x="6398514" y="1464097"/>
+            <a:ext cx="5490972" cy="4934684"/>
+          </a:xfrm>
+          <a:prstGeom prst="rect">
+            <a:avLst/>
+          </a:prstGeom>
+          <a:noFill/>
+        </p:spPr>
+        <p:txBody>
+          <a:bodyPr wrap="square">
+            <a:spAutoFit/>
+          </a:bodyPr>
+          <a:lstStyle/>
+          <a:p>
+            <a:pPr indent="450215" algn="just">
+              <a:buNone/>
+            </a:pPr>
+            <a:r>
+              <a:rPr lang="ru-RU" b="1" dirty="0">
+                <a:effectLst/>
+                <a:latin typeface="Arial" panose="020B0604020202020204" pitchFamily="34" charset="0"/>
+                <a:ea typeface="Calibri" panose="020F0502020204030204" pitchFamily="34" charset="0"/>
+                <a:cs typeface="Arial" panose="020B0604020202020204" pitchFamily="34" charset="0"/>
+              </a:rPr>
+              <a:t>Что делает: </a:t>
+            </a:r>
+            <a:r>
+              <a:rPr lang="ru-RU" dirty="0">
+                <a:effectLst/>
+                <a:latin typeface="Arial" panose="020B0604020202020204" pitchFamily="34" charset="0"/>
+                <a:ea typeface="Calibri" panose="020F0502020204030204" pitchFamily="34" charset="0"/>
+                <a:cs typeface="Arial" panose="020B0604020202020204" pitchFamily="34" charset="0"/>
+              </a:rPr>
+              <a:t>восстанавливает исходное дерево по коду </a:t>
+            </a:r>
+            <a:r>
+              <a:rPr lang="ru-RU" dirty="0" err="1">
+                <a:effectLst/>
+                <a:latin typeface="Arial" panose="020B0604020202020204" pitchFamily="34" charset="0"/>
+                <a:ea typeface="Calibri" panose="020F0502020204030204" pitchFamily="34" charset="0"/>
+                <a:cs typeface="Arial" panose="020B0604020202020204" pitchFamily="34" charset="0"/>
+              </a:rPr>
+              <a:t>Прюфера</a:t>
+            </a:r>
+            <a:r>
+              <a:rPr lang="ru-RU" dirty="0">
+                <a:effectLst/>
+                <a:latin typeface="Arial" panose="020B0604020202020204" pitchFamily="34" charset="0"/>
+                <a:ea typeface="Calibri" panose="020F0502020204030204" pitchFamily="34" charset="0"/>
+                <a:cs typeface="Arial" panose="020B0604020202020204" pitchFamily="34" charset="0"/>
+              </a:rPr>
+              <a:t>.</a:t>
+            </a:r>
+          </a:p>
+          <a:p>
+            <a:pPr indent="450215" algn="just">
+              <a:buNone/>
+            </a:pPr>
+            <a:endParaRPr lang="ru-RU" dirty="0">
+              <a:effectLst/>
+              <a:latin typeface="Arial" panose="020B0604020202020204" pitchFamily="34" charset="0"/>
+              <a:ea typeface="Calibri" panose="020F0502020204030204" pitchFamily="34" charset="0"/>
+              <a:cs typeface="Arial" panose="020B0604020202020204" pitchFamily="34" charset="0"/>
+            </a:endParaRPr>
+          </a:p>
+          <a:p>
+            <a:pPr indent="450215" algn="just">
+              <a:buNone/>
+            </a:pPr>
+            <a:r>
+              <a:rPr lang="ru-RU" b="1" dirty="0">
+                <a:effectLst/>
+                <a:latin typeface="Arial" panose="020B0604020202020204" pitchFamily="34" charset="0"/>
+                <a:ea typeface="Calibri" panose="020F0502020204030204" pitchFamily="34" charset="0"/>
+                <a:cs typeface="Arial" panose="020B0604020202020204" pitchFamily="34" charset="0"/>
+              </a:rPr>
+              <a:t>Как работает:</a:t>
+            </a:r>
+          </a:p>
+          <a:p>
+            <a:pPr indent="450215" algn="just">
+              <a:buNone/>
+            </a:pPr>
+            <a:endParaRPr lang="ru-RU" dirty="0">
+              <a:effectLst/>
+              <a:latin typeface="Arial" panose="020B0604020202020204" pitchFamily="34" charset="0"/>
+              <a:ea typeface="Calibri" panose="020F0502020204030204" pitchFamily="34" charset="0"/>
+              <a:cs typeface="Arial" panose="020B0604020202020204" pitchFamily="34" charset="0"/>
+            </a:endParaRPr>
+          </a:p>
+          <a:p>
+            <a:pPr marL="742950" lvl="1" indent="-285750" algn="l">
+              <a:spcAft>
+                <a:spcPts val="800"/>
+              </a:spcAft>
+              <a:buSzPts val="1400"/>
+              <a:buFont typeface="+mj-lt"/>
+              <a:buAutoNum type="arabicPeriod"/>
+            </a:pPr>
+            <a:r>
+              <a:rPr lang="ru-RU" dirty="0">
+                <a:effectLst/>
+                <a:latin typeface="Arial" panose="020B0604020202020204" pitchFamily="34" charset="0"/>
+                <a:ea typeface="Calibri" panose="020F0502020204030204" pitchFamily="34" charset="0"/>
+                <a:cs typeface="Arial" panose="020B0604020202020204" pitchFamily="34" charset="0"/>
+              </a:rPr>
+              <a:t>Определяет количество вершин (длина кода + 2).</a:t>
+            </a:r>
+          </a:p>
+          <a:p>
+            <a:pPr marL="742950" lvl="1" indent="-285750" algn="l">
+              <a:spcAft>
+                <a:spcPts val="800"/>
+              </a:spcAft>
+              <a:buSzPts val="1400"/>
+              <a:buFont typeface="+mj-lt"/>
+              <a:buAutoNum type="arabicPeriod"/>
+            </a:pPr>
+            <a:r>
+              <a:rPr lang="ru-RU" dirty="0">
+                <a:effectLst/>
+                <a:latin typeface="Arial" panose="020B0604020202020204" pitchFamily="34" charset="0"/>
+                <a:ea typeface="Calibri" panose="020F0502020204030204" pitchFamily="34" charset="0"/>
+                <a:cs typeface="Arial" panose="020B0604020202020204" pitchFamily="34" charset="0"/>
+              </a:rPr>
+              <a:t>Вычисляет степени вершин (сколько раз каждая встречается в коде + 1).</a:t>
+            </a:r>
+          </a:p>
+          <a:p>
+            <a:pPr marL="742950" lvl="1" indent="-285750" algn="l">
+              <a:spcAft>
+                <a:spcPts val="800"/>
+              </a:spcAft>
+              <a:buSzPts val="1400"/>
+              <a:buFont typeface="+mj-lt"/>
+              <a:buAutoNum type="arabicPeriod"/>
+            </a:pPr>
+            <a:r>
+              <a:rPr lang="ru-RU" dirty="0">
+                <a:effectLst/>
+                <a:latin typeface="Arial" panose="020B0604020202020204" pitchFamily="34" charset="0"/>
+                <a:ea typeface="Calibri" panose="020F0502020204030204" pitchFamily="34" charset="0"/>
+                <a:cs typeface="Arial" panose="020B0604020202020204" pitchFamily="34" charset="0"/>
+              </a:rPr>
+              <a:t>На каждом шаге соединяет наименьший доступный лист с текущей вершиной из кода.</a:t>
+            </a:r>
+          </a:p>
+          <a:p>
+            <a:pPr marL="742950" lvl="1" indent="-285750" algn="l">
+              <a:spcAft>
+                <a:spcPts val="800"/>
+              </a:spcAft>
+              <a:buSzPts val="1400"/>
+              <a:buFont typeface="+mj-lt"/>
+              <a:buAutoNum type="arabicPeriod"/>
+            </a:pPr>
+            <a:r>
+              <a:rPr lang="ru-RU" dirty="0">
+                <a:effectLst/>
+                <a:latin typeface="Arial" panose="020B0604020202020204" pitchFamily="34" charset="0"/>
+                <a:ea typeface="Calibri" panose="020F0502020204030204" pitchFamily="34" charset="0"/>
+                <a:cs typeface="Arial" panose="020B0604020202020204" pitchFamily="34" charset="0"/>
+              </a:rPr>
+              <a:t>Уменьшает степени вершин и обновляет список листьев.</a:t>
+            </a:r>
+          </a:p>
+          <a:p>
+            <a:pPr marL="742950" lvl="1" indent="-285750" algn="l">
+              <a:buSzPts val="1400"/>
+              <a:buFont typeface="+mj-lt"/>
+              <a:buAutoNum type="arabicPeriod"/>
+            </a:pPr>
+            <a:r>
+              <a:rPr lang="ru-RU" dirty="0">
+                <a:effectLst/>
+                <a:latin typeface="Arial" panose="020B0604020202020204" pitchFamily="34" charset="0"/>
+                <a:ea typeface="Calibri" panose="020F0502020204030204" pitchFamily="34" charset="0"/>
+                <a:cs typeface="Arial" panose="020B0604020202020204" pitchFamily="34" charset="0"/>
+              </a:rPr>
+              <a:t>В конце соединяет две оставшиеся вершины.</a:t>
+            </a:r>
+          </a:p>
+        </p:txBody>
+      </p:sp>
+    </p:spTree>
+    <p:extLst>
+      <p:ext uri="{BB962C8B-B14F-4D97-AF65-F5344CB8AC3E}">
+        <p14:creationId xmlns:p14="http://schemas.microsoft.com/office/powerpoint/2010/main" val="1706416265"/>
+      </p:ext>
+    </p:extLst>
+  </p:cSld>
+  <p:clrMapOvr>
+    <a:masterClrMapping/>
+  </p:clrMapOvr>
+</p:sld>
+</file>
+
+<file path=ppt/slides/slide14.xml><?xml version="1.0" encoding="utf-8"?>
+<p:sld xmlns:a="http://schemas.openxmlformats.org/drawingml/2006/main" xmlns:r="http://schemas.openxmlformats.org/officeDocument/2006/relationships" xmlns:p="http://schemas.openxmlformats.org/presentationml/2006/main">
+  <p:cSld>
+    <p:spTree>
+      <p:nvGrpSpPr>
+        <p:cNvPr id="1" name="">
+          <a:extLst>
+            <a:ext uri="{FF2B5EF4-FFF2-40B4-BE49-F238E27FC236}">
+              <a16:creationId xmlns:a16="http://schemas.microsoft.com/office/drawing/2014/main" id="{F760D6A4-FF77-CBB4-F693-3217FD612576}"/>
+            </a:ext>
+          </a:extLst>
+        </p:cNvPr>
+        <p:cNvGrpSpPr/>
+        <p:nvPr/>
+      </p:nvGrpSpPr>
+      <p:grpSpPr>
+        <a:xfrm>
+          <a:off x="0" y="0"/>
+          <a:ext cx="0" cy="0"/>
+          <a:chOff x="0" y="0"/>
+          <a:chExt cx="0" cy="0"/>
+        </a:xfrm>
+      </p:grpSpPr>
+      <p:sp>
+        <p:nvSpPr>
+          <p:cNvPr id="2" name="Рамка 1">
+            <a:extLst>
+              <a:ext uri="{FF2B5EF4-FFF2-40B4-BE49-F238E27FC236}">
+                <a16:creationId xmlns:a16="http://schemas.microsoft.com/office/drawing/2014/main" id="{5F803ECF-79D4-0F95-7F47-E85A2B8483ED}"/>
+              </a:ext>
+            </a:extLst>
+          </p:cNvPr>
+          <p:cNvSpPr/>
+          <p:nvPr/>
+        </p:nvSpPr>
+        <p:spPr>
+          <a:xfrm>
+            <a:off x="0" y="0"/>
+            <a:ext cx="12192000" cy="6858000"/>
+          </a:xfrm>
+          <a:prstGeom prst="frame">
+            <a:avLst>
+              <a:gd name="adj1" fmla="val 2233"/>
+            </a:avLst>
+          </a:prstGeom>
+          <a:solidFill>
+            <a:srgbClr val="9B2D1F"/>
+          </a:solidFill>
+          <a:ln>
+            <a:solidFill>
+              <a:srgbClr val="9B2D1F"/>
+            </a:solidFill>
+          </a:ln>
+        </p:spPr>
+        <p:style>
+          <a:lnRef idx="2">
+            <a:schemeClr val="accent1">
+              <a:shade val="15000"/>
+            </a:schemeClr>
+          </a:lnRef>
+          <a:fillRef idx="1">
+            <a:schemeClr val="accent1"/>
+          </a:fillRef>
+          <a:effectRef idx="0">
+            <a:schemeClr val="accent1"/>
+          </a:effectRef>
+          <a:fontRef idx="minor">
+            <a:schemeClr val="lt1"/>
+          </a:fontRef>
+        </p:style>
+        <p:txBody>
+          <a:bodyPr rtlCol="0" anchor="ctr"/>
+          <a:lstStyle/>
+          <a:p>
+            <a:pPr algn="ctr"/>
+            <a:endParaRPr lang="ru-RU">
+              <a:solidFill>
+                <a:schemeClr val="tx1"/>
+              </a:solidFill>
+            </a:endParaRPr>
+          </a:p>
+        </p:txBody>
+      </p:sp>
+      <p:sp>
+        <p:nvSpPr>
+          <p:cNvPr id="11" name="Заголовок 6">
+            <a:extLst>
+              <a:ext uri="{FF2B5EF4-FFF2-40B4-BE49-F238E27FC236}">
+                <a16:creationId xmlns:a16="http://schemas.microsoft.com/office/drawing/2014/main" id="{41A9F986-5973-365E-8F3F-DEBEFC7808F8}"/>
+              </a:ext>
+            </a:extLst>
+          </p:cNvPr>
+          <p:cNvSpPr>
+            <a:spLocks noGrp="1"/>
+          </p:cNvSpPr>
+          <p:nvPr>
+            <p:ph type="title"/>
+          </p:nvPr>
+        </p:nvSpPr>
+        <p:spPr>
+          <a:xfrm>
+            <a:off x="3800415" y="318443"/>
+            <a:ext cx="4885552" cy="634082"/>
+          </a:xfrm>
+        </p:spPr>
+        <p:txBody>
+          <a:bodyPr vert="horz" lIns="91440" tIns="45720" rIns="91440" bIns="45720" rtlCol="0" anchor="ctr">
+            <a:normAutofit/>
+          </a:bodyPr>
+          <a:lstStyle/>
+          <a:p>
+            <a:r>
+              <a:rPr lang="ru-RU" sz="3200" b="1" dirty="0">
+                <a:solidFill>
+                  <a:srgbClr val="9B2D1F"/>
+                </a:solidFill>
+                <a:latin typeface="Arial" panose="020B0604020202020204" pitchFamily="34" charset="0"/>
+                <a:cs typeface="Arial" panose="020B0604020202020204" pitchFamily="34" charset="0"/>
+              </a:rPr>
+              <a:t>МЕТОД МОНТЕ КАРЛО</a:t>
+            </a:r>
+          </a:p>
+        </p:txBody>
+      </p:sp>
+      <p:sp>
+        <p:nvSpPr>
+          <p:cNvPr id="6" name="TextBox 5">
+            <a:extLst>
+              <a:ext uri="{FF2B5EF4-FFF2-40B4-BE49-F238E27FC236}">
+                <a16:creationId xmlns:a16="http://schemas.microsoft.com/office/drawing/2014/main" id="{997A4A22-2432-07CA-6DE8-C60235C38464}"/>
+              </a:ext>
+            </a:extLst>
+          </p:cNvPr>
+          <p:cNvSpPr txBox="1"/>
+          <p:nvPr/>
+        </p:nvSpPr>
+        <p:spPr>
+          <a:xfrm>
+            <a:off x="4386959" y="814433"/>
+            <a:ext cx="3712464" cy="456535"/>
+          </a:xfrm>
+          <a:prstGeom prst="rect">
+            <a:avLst/>
+          </a:prstGeom>
+          <a:noFill/>
+        </p:spPr>
+        <p:txBody>
+          <a:bodyPr wrap="square">
+            <a:spAutoFit/>
+          </a:bodyPr>
+          <a:lstStyle/>
+          <a:p>
+            <a:pPr indent="450215" algn="just">
+              <a:lnSpc>
+                <a:spcPct val="150000"/>
+              </a:lnSpc>
+              <a:buNone/>
+            </a:pPr>
+            <a:r>
+              <a:rPr lang="ru-RU" sz="1800" b="1" dirty="0">
+                <a:effectLst/>
+                <a:latin typeface="Arial" panose="020B0604020202020204" pitchFamily="34" charset="0"/>
+                <a:ea typeface="Calibri" panose="020F0502020204030204" pitchFamily="34" charset="0"/>
+                <a:cs typeface="Arial" panose="020B0604020202020204" pitchFamily="34" charset="0"/>
+              </a:rPr>
+              <a:t>Нахождение числа </a:t>
+            </a:r>
+            <a:r>
+              <a:rPr lang="en-US" sz="1800" b="1" dirty="0">
+                <a:effectLst/>
+                <a:latin typeface="Arial" panose="020B0604020202020204" pitchFamily="34" charset="0"/>
+                <a:ea typeface="Calibri" panose="020F0502020204030204" pitchFamily="34" charset="0"/>
+                <a:cs typeface="Arial" panose="020B0604020202020204" pitchFamily="34" charset="0"/>
+                <a:sym typeface="Symbol" panose="05050102010706020507" pitchFamily="18" charset="2"/>
+              </a:rPr>
+              <a:t></a:t>
+            </a:r>
+            <a:endParaRPr lang="ru-RU" sz="1800" b="1" dirty="0">
+              <a:effectLst/>
+              <a:latin typeface="Arial" panose="020B0604020202020204" pitchFamily="34" charset="0"/>
+              <a:ea typeface="Calibri" panose="020F0502020204030204" pitchFamily="34" charset="0"/>
+              <a:cs typeface="Arial" panose="020B0604020202020204" pitchFamily="34" charset="0"/>
+            </a:endParaRPr>
+          </a:p>
+        </p:txBody>
+      </p:sp>
+      <p:pic>
+        <p:nvPicPr>
+          <p:cNvPr id="5" name="Рисунок 4">
+            <a:extLst>
+              <a:ext uri="{FF2B5EF4-FFF2-40B4-BE49-F238E27FC236}">
+                <a16:creationId xmlns:a16="http://schemas.microsoft.com/office/drawing/2014/main" id="{61DF60F9-AE85-B1EE-A178-D17B74E73328}"/>
+              </a:ext>
+            </a:extLst>
+          </p:cNvPr>
+          <p:cNvPicPr>
+            <a:picLocks noChangeAspect="1"/>
+          </p:cNvPicPr>
+          <p:nvPr/>
+        </p:nvPicPr>
+        <p:blipFill>
+          <a:blip r:embed="rId2"/>
+          <a:stretch>
+            <a:fillRect/>
+          </a:stretch>
+        </p:blipFill>
+        <p:spPr>
+          <a:xfrm>
+            <a:off x="1323275" y="1448515"/>
+            <a:ext cx="9545449" cy="4834708"/>
+          </a:xfrm>
+          <a:prstGeom prst="rect">
+            <a:avLst/>
+          </a:prstGeom>
+        </p:spPr>
+      </p:pic>
+    </p:spTree>
+    <p:extLst>
+      <p:ext uri="{BB962C8B-B14F-4D97-AF65-F5344CB8AC3E}">
+        <p14:creationId xmlns:p14="http://schemas.microsoft.com/office/powerpoint/2010/main" val="2103499643"/>
+      </p:ext>
+    </p:extLst>
+  </p:cSld>
+  <p:clrMapOvr>
+    <a:masterClrMapping/>
+  </p:clrMapOvr>
+</p:sld>
+</file>
+
+<file path=ppt/slides/slide15.xml><?xml version="1.0" encoding="utf-8"?>
+<p:sld xmlns:a="http://schemas.openxmlformats.org/drawingml/2006/main" xmlns:r="http://schemas.openxmlformats.org/officeDocument/2006/relationships" xmlns:p="http://schemas.openxmlformats.org/presentationml/2006/main">
+  <p:cSld>
+    <p:spTree>
+      <p:nvGrpSpPr>
+        <p:cNvPr id="1" name="">
+          <a:extLst>
+            <a:ext uri="{FF2B5EF4-FFF2-40B4-BE49-F238E27FC236}">
+              <a16:creationId xmlns:a16="http://schemas.microsoft.com/office/drawing/2014/main" id="{B7F9C7EC-1BB0-DC0B-2588-441C2CE340B2}"/>
+            </a:ext>
+          </a:extLst>
+        </p:cNvPr>
+        <p:cNvGrpSpPr/>
+        <p:nvPr/>
+      </p:nvGrpSpPr>
+      <p:grpSpPr>
+        <a:xfrm>
+          <a:off x="0" y="0"/>
+          <a:ext cx="0" cy="0"/>
+          <a:chOff x="0" y="0"/>
+          <a:chExt cx="0" cy="0"/>
+        </a:xfrm>
+      </p:grpSpPr>
+      <p:sp>
+        <p:nvSpPr>
+          <p:cNvPr id="2" name="Рамка 1">
+            <a:extLst>
+              <a:ext uri="{FF2B5EF4-FFF2-40B4-BE49-F238E27FC236}">
+                <a16:creationId xmlns:a16="http://schemas.microsoft.com/office/drawing/2014/main" id="{AD8AC6EE-0A17-F1C7-D904-ADC0646DFD8F}"/>
+              </a:ext>
+            </a:extLst>
+          </p:cNvPr>
+          <p:cNvSpPr/>
+          <p:nvPr/>
+        </p:nvSpPr>
+        <p:spPr>
+          <a:xfrm>
+            <a:off x="0" y="0"/>
+            <a:ext cx="12192000" cy="6858000"/>
+          </a:xfrm>
+          <a:prstGeom prst="frame">
+            <a:avLst>
+              <a:gd name="adj1" fmla="val 2233"/>
+            </a:avLst>
+          </a:prstGeom>
+          <a:solidFill>
+            <a:srgbClr val="9B2D1F"/>
+          </a:solidFill>
+          <a:ln>
+            <a:solidFill>
+              <a:srgbClr val="9B2D1F"/>
+            </a:solidFill>
+          </a:ln>
+        </p:spPr>
+        <p:style>
+          <a:lnRef idx="2">
+            <a:schemeClr val="accent1">
+              <a:shade val="15000"/>
+            </a:schemeClr>
+          </a:lnRef>
+          <a:fillRef idx="1">
+            <a:schemeClr val="accent1"/>
+          </a:fillRef>
+          <a:effectRef idx="0">
+            <a:schemeClr val="accent1"/>
+          </a:effectRef>
+          <a:fontRef idx="minor">
+            <a:schemeClr val="lt1"/>
+          </a:fontRef>
+        </p:style>
+        <p:txBody>
+          <a:bodyPr rtlCol="0" anchor="ctr"/>
+          <a:lstStyle/>
+          <a:p>
+            <a:pPr algn="ctr"/>
+            <a:endParaRPr lang="ru-RU">
+              <a:solidFill>
+                <a:schemeClr val="tx1"/>
+              </a:solidFill>
+            </a:endParaRPr>
+          </a:p>
+        </p:txBody>
+      </p:sp>
+      <p:sp>
+        <p:nvSpPr>
+          <p:cNvPr id="11" name="Заголовок 6">
+            <a:extLst>
+              <a:ext uri="{FF2B5EF4-FFF2-40B4-BE49-F238E27FC236}">
+                <a16:creationId xmlns:a16="http://schemas.microsoft.com/office/drawing/2014/main" id="{98FA1511-A553-1EC5-41F3-EA046E4E9AD0}"/>
+              </a:ext>
+            </a:extLst>
+          </p:cNvPr>
+          <p:cNvSpPr>
+            <a:spLocks noGrp="1"/>
+          </p:cNvSpPr>
+          <p:nvPr>
+            <p:ph type="title"/>
+          </p:nvPr>
+        </p:nvSpPr>
+        <p:spPr>
+          <a:xfrm>
+            <a:off x="3800415" y="353461"/>
+            <a:ext cx="4885552" cy="634082"/>
+          </a:xfrm>
+        </p:spPr>
+        <p:txBody>
+          <a:bodyPr vert="horz" lIns="91440" tIns="45720" rIns="91440" bIns="45720" rtlCol="0" anchor="ctr">
+            <a:normAutofit/>
+          </a:bodyPr>
+          <a:lstStyle/>
+          <a:p>
+            <a:r>
+              <a:rPr lang="ru-RU" sz="3200" b="1" dirty="0">
+                <a:solidFill>
+                  <a:srgbClr val="9B2D1F"/>
+                </a:solidFill>
+                <a:latin typeface="Arial" panose="020B0604020202020204" pitchFamily="34" charset="0"/>
+                <a:cs typeface="Arial" panose="020B0604020202020204" pitchFamily="34" charset="0"/>
+              </a:rPr>
+              <a:t>МЕТОД МОНТЕ КАРЛО</a:t>
+            </a:r>
+          </a:p>
+        </p:txBody>
+      </p:sp>
+      <p:sp>
+        <p:nvSpPr>
+          <p:cNvPr id="6" name="TextBox 5">
+            <a:extLst>
+              <a:ext uri="{FF2B5EF4-FFF2-40B4-BE49-F238E27FC236}">
+                <a16:creationId xmlns:a16="http://schemas.microsoft.com/office/drawing/2014/main" id="{840114B9-9A3A-23A4-E5BB-2822D776894D}"/>
+              </a:ext>
+            </a:extLst>
+          </p:cNvPr>
+          <p:cNvSpPr txBox="1"/>
+          <p:nvPr/>
+        </p:nvSpPr>
+        <p:spPr>
+          <a:xfrm>
+            <a:off x="4239768" y="877929"/>
+            <a:ext cx="3712464" cy="463075"/>
+          </a:xfrm>
+          <a:prstGeom prst="rect">
+            <a:avLst/>
+          </a:prstGeom>
+          <a:noFill/>
+        </p:spPr>
+        <p:txBody>
+          <a:bodyPr wrap="square">
+            <a:spAutoFit/>
+          </a:bodyPr>
+          <a:lstStyle/>
+          <a:p>
+            <a:pPr indent="450215" algn="just">
+              <a:lnSpc>
+                <a:spcPct val="150000"/>
+              </a:lnSpc>
+              <a:buNone/>
+            </a:pPr>
+            <a:r>
+              <a:rPr lang="ru-RU" b="1" dirty="0"/>
+              <a:t>Вычисление площади фигуры </a:t>
+            </a:r>
+            <a:endParaRPr lang="ru-RU" sz="1800" b="1" dirty="0">
+              <a:effectLst/>
+              <a:latin typeface="Arial" panose="020B0604020202020204" pitchFamily="34" charset="0"/>
+              <a:ea typeface="Calibri" panose="020F0502020204030204" pitchFamily="34" charset="0"/>
+              <a:cs typeface="Arial" panose="020B0604020202020204" pitchFamily="34" charset="0"/>
+            </a:endParaRPr>
+          </a:p>
+        </p:txBody>
+      </p:sp>
+      <p:pic>
+        <p:nvPicPr>
+          <p:cNvPr id="4" name="Рисунок 3">
+            <a:extLst>
+              <a:ext uri="{FF2B5EF4-FFF2-40B4-BE49-F238E27FC236}">
+                <a16:creationId xmlns:a16="http://schemas.microsoft.com/office/drawing/2014/main" id="{0CF2EC5B-3F45-9B74-0034-771707F0376B}"/>
+              </a:ext>
+            </a:extLst>
+          </p:cNvPr>
+          <p:cNvPicPr>
+            <a:picLocks noChangeAspect="1"/>
+          </p:cNvPicPr>
+          <p:nvPr/>
+        </p:nvPicPr>
+        <p:blipFill>
+          <a:blip r:embed="rId2"/>
+          <a:srcRect l="300" r="1"/>
+          <a:stretch>
+            <a:fillRect/>
+          </a:stretch>
+        </p:blipFill>
+        <p:spPr>
+          <a:xfrm>
+            <a:off x="779526" y="1582677"/>
+            <a:ext cx="10632948" cy="3893813"/>
+          </a:xfrm>
+          <a:prstGeom prst="rect">
+            <a:avLst/>
+          </a:prstGeom>
+        </p:spPr>
+      </p:pic>
+    </p:spTree>
+    <p:extLst>
+      <p:ext uri="{BB962C8B-B14F-4D97-AF65-F5344CB8AC3E}">
+        <p14:creationId xmlns:p14="http://schemas.microsoft.com/office/powerpoint/2010/main" val="1356525527"/>
       </p:ext>
     </p:extLst>
   </p:cSld>
@@ -6350,86 +7712,6 @@
   <p:cSld>
     <p:spTree>
       <p:nvGrpSpPr>
-        <p:cNvPr id="1" name=""/>
-        <p:cNvGrpSpPr/>
-        <p:nvPr/>
-      </p:nvGrpSpPr>
-      <p:grpSpPr>
-        <a:xfrm>
-          <a:off x="0" y="0"/>
-          <a:ext cx="0" cy="0"/>
-          <a:chOff x="0" y="0"/>
-          <a:chExt cx="0" cy="0"/>
-        </a:xfrm>
-      </p:grpSpPr>
-      <p:sp>
-        <p:nvSpPr>
-          <p:cNvPr id="2" name="Title 1">
-            <a:extLst>
-              <a:ext uri="{FF2B5EF4-FFF2-40B4-BE49-F238E27FC236}">
-                <a16:creationId xmlns:a16="http://schemas.microsoft.com/office/drawing/2014/main" id="{3E9642DF-F77C-E76B-37D4-19B4E22575D7}"/>
-              </a:ext>
-            </a:extLst>
-          </p:cNvPr>
-          <p:cNvSpPr>
-            <a:spLocks noGrp="1"/>
-          </p:cNvSpPr>
-          <p:nvPr>
-            <p:ph type="title"/>
-          </p:nvPr>
-        </p:nvSpPr>
-        <p:spPr/>
-        <p:txBody>
-          <a:bodyPr/>
-          <a:lstStyle/>
-          <a:p>
-            <a:endParaRPr lang="ru-RU"/>
-          </a:p>
-        </p:txBody>
-      </p:sp>
-      <p:sp>
-        <p:nvSpPr>
-          <p:cNvPr id="3" name="Content Placeholder 2">
-            <a:extLst>
-              <a:ext uri="{FF2B5EF4-FFF2-40B4-BE49-F238E27FC236}">
-                <a16:creationId xmlns:a16="http://schemas.microsoft.com/office/drawing/2014/main" id="{3E93905C-C8D0-91D0-3F88-367C0568C970}"/>
-              </a:ext>
-            </a:extLst>
-          </p:cNvPr>
-          <p:cNvSpPr>
-            <a:spLocks noGrp="1"/>
-          </p:cNvSpPr>
-          <p:nvPr>
-            <p:ph idx="1"/>
-          </p:nvPr>
-        </p:nvSpPr>
-        <p:spPr/>
-        <p:txBody>
-          <a:bodyPr/>
-          <a:lstStyle/>
-          <a:p>
-            <a:endParaRPr lang="ru-RU"/>
-          </a:p>
-        </p:txBody>
-      </p:sp>
-    </p:spTree>
-    <p:extLst>
-      <p:ext uri="{BB962C8B-B14F-4D97-AF65-F5344CB8AC3E}">
-        <p14:creationId xmlns:p14="http://schemas.microsoft.com/office/powerpoint/2010/main" val="1722653702"/>
-      </p:ext>
-    </p:extLst>
-  </p:cSld>
-  <p:clrMapOvr>
-    <a:masterClrMapping/>
-  </p:clrMapOvr>
-</p:sld>
-</file>
-
-<file path=ppt/slides/slide8.xml><?xml version="1.0" encoding="utf-8"?>
-<p:sld xmlns:a="http://schemas.openxmlformats.org/drawingml/2006/main" xmlns:r="http://schemas.openxmlformats.org/officeDocument/2006/relationships" xmlns:p="http://schemas.openxmlformats.org/presentationml/2006/main">
-  <p:cSld>
-    <p:spTree>
-      <p:nvGrpSpPr>
         <p:cNvPr id="1" name="">
           <a:extLst>
             <a:ext uri="{FF2B5EF4-FFF2-40B4-BE49-F238E27FC236}">
@@ -6624,7 +7906,7 @@
 </p:sld>
 </file>
 
-<file path=ppt/slides/slide9.xml><?xml version="1.0" encoding="utf-8"?>
+<file path=ppt/slides/slide8.xml><?xml version="1.0" encoding="utf-8"?>
 <p:sld xmlns:a="http://schemas.openxmlformats.org/drawingml/2006/main" xmlns:r="http://schemas.openxmlformats.org/officeDocument/2006/relationships" xmlns:p="http://schemas.openxmlformats.org/presentationml/2006/main">
   <p:cSld>
     <p:spTree>
@@ -6844,6 +8126,205 @@
     <p:extLst>
       <p:ext uri="{BB962C8B-B14F-4D97-AF65-F5344CB8AC3E}">
         <p14:creationId xmlns:p14="http://schemas.microsoft.com/office/powerpoint/2010/main" val="956662569"/>
+      </p:ext>
+    </p:extLst>
+  </p:cSld>
+  <p:clrMapOvr>
+    <a:masterClrMapping/>
+  </p:clrMapOvr>
+</p:sld>
+</file>
+
+<file path=ppt/slides/slide9.xml><?xml version="1.0" encoding="utf-8"?>
+<p:sld xmlns:a="http://schemas.openxmlformats.org/drawingml/2006/main" xmlns:r="http://schemas.openxmlformats.org/officeDocument/2006/relationships" xmlns:p="http://schemas.openxmlformats.org/presentationml/2006/main">
+  <p:cSld>
+    <p:spTree>
+      <p:nvGrpSpPr>
+        <p:cNvPr id="1" name="">
+          <a:extLst>
+            <a:ext uri="{FF2B5EF4-FFF2-40B4-BE49-F238E27FC236}">
+              <a16:creationId xmlns:a16="http://schemas.microsoft.com/office/drawing/2014/main" id="{23FA106F-4F80-E868-99AA-BA824C5C49FD}"/>
+            </a:ext>
+          </a:extLst>
+        </p:cNvPr>
+        <p:cNvGrpSpPr/>
+        <p:nvPr/>
+      </p:nvGrpSpPr>
+      <p:grpSpPr>
+        <a:xfrm>
+          <a:off x="0" y="0"/>
+          <a:ext cx="0" cy="0"/>
+          <a:chOff x="0" y="0"/>
+          <a:chExt cx="0" cy="0"/>
+        </a:xfrm>
+      </p:grpSpPr>
+      <p:sp>
+        <p:nvSpPr>
+          <p:cNvPr id="2" name="Рамка 1">
+            <a:extLst>
+              <a:ext uri="{FF2B5EF4-FFF2-40B4-BE49-F238E27FC236}">
+                <a16:creationId xmlns:a16="http://schemas.microsoft.com/office/drawing/2014/main" id="{A5CF5D38-12D2-06CA-1246-67C1AE661BD6}"/>
+              </a:ext>
+            </a:extLst>
+          </p:cNvPr>
+          <p:cNvSpPr/>
+          <p:nvPr/>
+        </p:nvSpPr>
+        <p:spPr>
+          <a:xfrm>
+            <a:off x="0" y="0"/>
+            <a:ext cx="12192000" cy="6858000"/>
+          </a:xfrm>
+          <a:prstGeom prst="frame">
+            <a:avLst>
+              <a:gd name="adj1" fmla="val 2233"/>
+            </a:avLst>
+          </a:prstGeom>
+          <a:solidFill>
+            <a:srgbClr val="9B2D1F"/>
+          </a:solidFill>
+          <a:ln>
+            <a:solidFill>
+              <a:srgbClr val="9B2D1F"/>
+            </a:solidFill>
+          </a:ln>
+        </p:spPr>
+        <p:style>
+          <a:lnRef idx="2">
+            <a:schemeClr val="accent1">
+              <a:shade val="15000"/>
+            </a:schemeClr>
+          </a:lnRef>
+          <a:fillRef idx="1">
+            <a:schemeClr val="accent1"/>
+          </a:fillRef>
+          <a:effectRef idx="0">
+            <a:schemeClr val="accent1"/>
+          </a:effectRef>
+          <a:fontRef idx="minor">
+            <a:schemeClr val="lt1"/>
+          </a:fontRef>
+        </p:style>
+        <p:txBody>
+          <a:bodyPr rtlCol="0" anchor="ctr"/>
+          <a:lstStyle/>
+          <a:p>
+            <a:pPr algn="ctr"/>
+            <a:endParaRPr lang="ru-RU">
+              <a:solidFill>
+                <a:schemeClr val="tx1"/>
+              </a:solidFill>
+            </a:endParaRPr>
+          </a:p>
+        </p:txBody>
+      </p:sp>
+      <p:sp>
+        <p:nvSpPr>
+          <p:cNvPr id="11" name="Заголовок 6">
+            <a:extLst>
+              <a:ext uri="{FF2B5EF4-FFF2-40B4-BE49-F238E27FC236}">
+                <a16:creationId xmlns:a16="http://schemas.microsoft.com/office/drawing/2014/main" id="{F53FFCB9-7C46-BB16-D2BF-A7B0E30614CB}"/>
+              </a:ext>
+            </a:extLst>
+          </p:cNvPr>
+          <p:cNvSpPr>
+            <a:spLocks noGrp="1"/>
+          </p:cNvSpPr>
+          <p:nvPr>
+            <p:ph type="title"/>
+          </p:nvPr>
+        </p:nvSpPr>
+        <p:spPr>
+          <a:xfrm>
+            <a:off x="2110000" y="475816"/>
+            <a:ext cx="7972000" cy="634082"/>
+          </a:xfrm>
+        </p:spPr>
+        <p:txBody>
+          <a:bodyPr vert="horz" lIns="91440" tIns="45720" rIns="91440" bIns="45720" rtlCol="0" anchor="ctr">
+            <a:normAutofit/>
+          </a:bodyPr>
+          <a:lstStyle/>
+          <a:p>
+            <a:pPr algn="ctr"/>
+            <a:r>
+              <a:rPr lang="ru-RU" sz="3200" b="1" dirty="0">
+                <a:solidFill>
+                  <a:srgbClr val="9B2D1F"/>
+                </a:solidFill>
+                <a:latin typeface="Arial"/>
+                <a:cs typeface="Arial"/>
+              </a:rPr>
+              <a:t>ВЕРСТКА ПРОФИЛЯ</a:t>
+            </a:r>
+            <a:endParaRPr lang="ru-RU"/>
+          </a:p>
+        </p:txBody>
+      </p:sp>
+      <p:pic>
+        <p:nvPicPr>
+          <p:cNvPr id="3" name="Рисунок 2" descr="Изображение выглядит как текст, снимок экрана&#10;&#10;Содержимое, созданное искусственным интеллектом, может быть неверным.">
+            <a:extLst>
+              <a:ext uri="{FF2B5EF4-FFF2-40B4-BE49-F238E27FC236}">
+                <a16:creationId xmlns:a16="http://schemas.microsoft.com/office/drawing/2014/main" id="{19088A25-7D79-B5F5-669F-CB80BE7B03B7}"/>
+              </a:ext>
+            </a:extLst>
+          </p:cNvPr>
+          <p:cNvPicPr>
+            <a:picLocks noChangeAspect="1"/>
+          </p:cNvPicPr>
+          <p:nvPr/>
+        </p:nvPicPr>
+        <p:blipFill>
+          <a:blip r:embed="rId2"/>
+          <a:stretch>
+            <a:fillRect/>
+          </a:stretch>
+        </p:blipFill>
+        <p:spPr>
+          <a:xfrm>
+            <a:off x="954196" y="1712478"/>
+            <a:ext cx="5137498" cy="3767073"/>
+          </a:xfrm>
+          <a:prstGeom prst="rect">
+            <a:avLst/>
+          </a:prstGeom>
+        </p:spPr>
+      </p:pic>
+      <p:pic>
+        <p:nvPicPr>
+          <p:cNvPr id="6" name="Рисунок 5" descr="Изображение выглядит как текст, снимок экрана&#10;&#10;Содержимое, созданное искусственным интеллектом, может быть неверным.">
+            <a:extLst>
+              <a:ext uri="{FF2B5EF4-FFF2-40B4-BE49-F238E27FC236}">
+                <a16:creationId xmlns:a16="http://schemas.microsoft.com/office/drawing/2014/main" id="{6B5779B6-A723-B929-5FCA-C9B0C421A88A}"/>
+              </a:ext>
+            </a:extLst>
+          </p:cNvPr>
+          <p:cNvPicPr>
+            <a:picLocks noChangeAspect="1"/>
+          </p:cNvPicPr>
+          <p:nvPr/>
+        </p:nvPicPr>
+        <p:blipFill>
+          <a:blip r:embed="rId3"/>
+          <a:stretch>
+            <a:fillRect/>
+          </a:stretch>
+        </p:blipFill>
+        <p:spPr>
+          <a:xfrm>
+            <a:off x="6276518" y="1416029"/>
+            <a:ext cx="5588827" cy="4359971"/>
+          </a:xfrm>
+          <a:prstGeom prst="rect">
+            <a:avLst/>
+          </a:prstGeom>
+        </p:spPr>
+      </p:pic>
+    </p:spTree>
+    <p:extLst>
+      <p:ext uri="{BB962C8B-B14F-4D97-AF65-F5344CB8AC3E}">
+        <p14:creationId xmlns:p14="http://schemas.microsoft.com/office/powerpoint/2010/main" val="3925909502"/>
       </p:ext>
     </p:extLst>
   </p:cSld>
@@ -7146,4 +8627,299 @@
     </a:ext>
   </a:extLst>
 </a:theme>
+</file>
+
+<file path=ppt/theme/theme2.xml><?xml version="1.0" encoding="utf-8"?>
+<a:theme xmlns:a="http://schemas.openxmlformats.org/drawingml/2006/main" name="Тема Office">
+  <a:themeElements>
+    <a:clrScheme name="Стандартная">
+      <a:dk1>
+        <a:sysClr val="windowText" lastClr="000000"/>
+      </a:dk1>
+      <a:lt1>
+        <a:sysClr val="window" lastClr="FFFFFF"/>
+      </a:lt1>
+      <a:dk2>
+        <a:srgbClr val="44546A"/>
+      </a:dk2>
+      <a:lt2>
+        <a:srgbClr val="E7E6E6"/>
+      </a:lt2>
+      <a:accent1>
+        <a:srgbClr val="4472C4"/>
+      </a:accent1>
+      <a:accent2>
+        <a:srgbClr val="ED7D31"/>
+      </a:accent2>
+      <a:accent3>
+        <a:srgbClr val="A5A5A5"/>
+      </a:accent3>
+      <a:accent4>
+        <a:srgbClr val="FFC000"/>
+      </a:accent4>
+      <a:accent5>
+        <a:srgbClr val="5B9BD5"/>
+      </a:accent5>
+      <a:accent6>
+        <a:srgbClr val="70AD47"/>
+      </a:accent6>
+      <a:hlink>
+        <a:srgbClr val="0563C1"/>
+      </a:hlink>
+      <a:folHlink>
+        <a:srgbClr val="954F72"/>
+      </a:folHlink>
+    </a:clrScheme>
+    <a:fontScheme name="Стандартная">
+      <a:majorFont>
+        <a:latin typeface="Calibri Light" panose="020F0302020204030204"/>
+        <a:ea typeface=""/>
+        <a:cs typeface=""/>
+        <a:font script="Jpan" typeface="游ゴシック Light"/>
+        <a:font script="Hang" typeface="맑은 고딕"/>
+        <a:font script="Hans" typeface="等线 Light"/>
+        <a:font script="Hant" typeface="新細明體"/>
+        <a:font script="Arab" typeface="Times New Roman"/>
+        <a:font script="Hebr" typeface="Times New Roman"/>
+        <a:font script="Thai" typeface="Angsana New"/>
+        <a:font script="Ethi" typeface="Nyala"/>
+        <a:font script="Beng" typeface="Vrinda"/>
+        <a:font script="Gujr" typeface="Shruti"/>
+        <a:font script="Khmr" typeface="MoolBoran"/>
+        <a:font script="Knda" typeface="Tunga"/>
+        <a:font script="Guru" typeface="Raavi"/>
+        <a:font script="Cans" typeface="Euphemia"/>
+        <a:font script="Cher" typeface="Plantagenet Cherokee"/>
+        <a:font script="Yiii" typeface="Microsoft Yi Baiti"/>
+        <a:font script="Tibt" typeface="Microsoft Himalaya"/>
+        <a:font script="Thaa" typeface="MV Boli"/>
+        <a:font script="Deva" typeface="Mangal"/>
+        <a:font script="Telu" typeface="Gautami"/>
+        <a:font script="Taml" typeface="Latha"/>
+        <a:font script="Syrc" typeface="Estrangelo Edessa"/>
+        <a:font script="Orya" typeface="Kalinga"/>
+        <a:font script="Mlym" typeface="Kartika"/>
+        <a:font script="Laoo" typeface="DokChampa"/>
+        <a:font script="Sinh" typeface="Iskoola Pota"/>
+        <a:font script="Mong" typeface="Mongolian Baiti"/>
+        <a:font script="Viet" typeface="Times New Roman"/>
+        <a:font script="Uigh" typeface="Microsoft Uighur"/>
+        <a:font script="Geor" typeface="Sylfaen"/>
+        <a:font script="Armn" typeface="Arial"/>
+        <a:font script="Bugi" typeface="Leelawadee UI"/>
+        <a:font script="Bopo" typeface="Microsoft JhengHei"/>
+        <a:font script="Java" typeface="Javanese Text"/>
+        <a:font script="Lisu" typeface="Segoe UI"/>
+        <a:font script="Mymr" typeface="Myanmar Text"/>
+        <a:font script="Nkoo" typeface="Ebrima"/>
+        <a:font script="Olck" typeface="Nirmala UI"/>
+        <a:font script="Osma" typeface="Ebrima"/>
+        <a:font script="Phag" typeface="Phagspa"/>
+        <a:font script="Syrn" typeface="Estrangelo Edessa"/>
+        <a:font script="Syrj" typeface="Estrangelo Edessa"/>
+        <a:font script="Syre" typeface="Estrangelo Edessa"/>
+        <a:font script="Sora" typeface="Nirmala UI"/>
+        <a:font script="Tale" typeface="Microsoft Tai Le"/>
+        <a:font script="Talu" typeface="Microsoft New Tai Lue"/>
+        <a:font script="Tfng" typeface="Ebrima"/>
+      </a:majorFont>
+      <a:minorFont>
+        <a:latin typeface="Calibri" panose="020F0502020204030204"/>
+        <a:ea typeface=""/>
+        <a:cs typeface=""/>
+        <a:font script="Jpan" typeface="游ゴシック"/>
+        <a:font script="Hang" typeface="맑은 고딕"/>
+        <a:font script="Hans" typeface="等线"/>
+        <a:font script="Hant" typeface="新細明體"/>
+        <a:font script="Arab" typeface="Arial"/>
+        <a:font script="Hebr" typeface="Arial"/>
+        <a:font script="Thai" typeface="Cordia New"/>
+        <a:font script="Ethi" typeface="Nyala"/>
+        <a:font script="Beng" typeface="Vrinda"/>
+        <a:font script="Gujr" typeface="Shruti"/>
+        <a:font script="Khmr" typeface="DaunPenh"/>
+        <a:font script="Knda" typeface="Tunga"/>
+        <a:font script="Guru" typeface="Raavi"/>
+        <a:font script="Cans" typeface="Euphemia"/>
+        <a:font script="Cher" typeface="Plantagenet Cherokee"/>
+        <a:font script="Yiii" typeface="Microsoft Yi Baiti"/>
+        <a:font script="Tibt" typeface="Microsoft Himalaya"/>
+        <a:font script="Thaa" typeface="MV Boli"/>
+        <a:font script="Deva" typeface="Mangal"/>
+        <a:font script="Telu" typeface="Gautami"/>
+        <a:font script="Taml" typeface="Latha"/>
+        <a:font script="Syrc" typeface="Estrangelo Edessa"/>
+        <a:font script="Orya" typeface="Kalinga"/>
+        <a:font script="Mlym" typeface="Kartika"/>
+        <a:font script="Laoo" typeface="DokChampa"/>
+        <a:font script="Sinh" typeface="Iskoola Pota"/>
+        <a:font script="Mong" typeface="Mongolian Baiti"/>
+        <a:font script="Viet" typeface="Arial"/>
+        <a:font script="Uigh" typeface="Microsoft Uighur"/>
+        <a:font script="Geor" typeface="Sylfaen"/>
+        <a:font script="Armn" typeface="Arial"/>
+        <a:font script="Bugi" typeface="Leelawadee UI"/>
+        <a:font script="Bopo" typeface="Microsoft JhengHei"/>
+        <a:font script="Java" typeface="Javanese Text"/>
+        <a:font script="Lisu" typeface="Segoe UI"/>
+        <a:font script="Mymr" typeface="Myanmar Text"/>
+        <a:font script="Nkoo" typeface="Ebrima"/>
+        <a:font script="Olck" typeface="Nirmala UI"/>
+        <a:font script="Osma" typeface="Ebrima"/>
+        <a:font script="Phag" typeface="Phagspa"/>
+        <a:font script="Syrn" typeface="Estrangelo Edessa"/>
+        <a:font script="Syrj" typeface="Estrangelo Edessa"/>
+        <a:font script="Syre" typeface="Estrangelo Edessa"/>
+        <a:font script="Sora" typeface="Nirmala UI"/>
+        <a:font script="Tale" typeface="Microsoft Tai Le"/>
+        <a:font script="Talu" typeface="Microsoft New Tai Lue"/>
+        <a:font script="Tfng" typeface="Ebrima"/>
+      </a:minorFont>
+    </a:fontScheme>
+    <a:fmtScheme name="Стандартная">
+      <a:fillStyleLst>
+        <a:solidFill>
+          <a:schemeClr val="phClr"/>
+        </a:solidFill>
+        <a:gradFill rotWithShape="1">
+          <a:gsLst>
+            <a:gs pos="0">
+              <a:schemeClr val="phClr">
+                <a:lumMod val="110000"/>
+                <a:satMod val="105000"/>
+                <a:tint val="67000"/>
+              </a:schemeClr>
+            </a:gs>
+            <a:gs pos="50000">
+              <a:schemeClr val="phClr">
+                <a:lumMod val="105000"/>
+                <a:satMod val="103000"/>
+                <a:tint val="73000"/>
+              </a:schemeClr>
+            </a:gs>
+            <a:gs pos="100000">
+              <a:schemeClr val="phClr">
+                <a:lumMod val="105000"/>
+                <a:satMod val="109000"/>
+                <a:tint val="81000"/>
+              </a:schemeClr>
+            </a:gs>
+          </a:gsLst>
+          <a:lin ang="5400000" scaled="0"/>
+        </a:gradFill>
+        <a:gradFill rotWithShape="1">
+          <a:gsLst>
+            <a:gs pos="0">
+              <a:schemeClr val="phClr">
+                <a:satMod val="103000"/>
+                <a:lumMod val="102000"/>
+                <a:tint val="94000"/>
+              </a:schemeClr>
+            </a:gs>
+            <a:gs pos="50000">
+              <a:schemeClr val="phClr">
+                <a:satMod val="110000"/>
+                <a:lumMod val="100000"/>
+                <a:shade val="100000"/>
+              </a:schemeClr>
+            </a:gs>
+            <a:gs pos="100000">
+              <a:schemeClr val="phClr">
+                <a:lumMod val="99000"/>
+                <a:satMod val="120000"/>
+                <a:shade val="78000"/>
+              </a:schemeClr>
+            </a:gs>
+          </a:gsLst>
+          <a:lin ang="5400000" scaled="0"/>
+        </a:gradFill>
+      </a:fillStyleLst>
+      <a:lnStyleLst>
+        <a:ln w="6350" cap="flat" cmpd="sng" algn="ctr">
+          <a:solidFill>
+            <a:schemeClr val="phClr"/>
+          </a:solidFill>
+          <a:prstDash val="solid"/>
+          <a:miter lim="800000"/>
+        </a:ln>
+        <a:ln w="12700" cap="flat" cmpd="sng" algn="ctr">
+          <a:solidFill>
+            <a:schemeClr val="phClr"/>
+          </a:solidFill>
+          <a:prstDash val="solid"/>
+          <a:miter lim="800000"/>
+        </a:ln>
+        <a:ln w="19050" cap="flat" cmpd="sng" algn="ctr">
+          <a:solidFill>
+            <a:schemeClr val="phClr"/>
+          </a:solidFill>
+          <a:prstDash val="solid"/>
+          <a:miter lim="800000"/>
+        </a:ln>
+      </a:lnStyleLst>
+      <a:effectStyleLst>
+        <a:effectStyle>
+          <a:effectLst/>
+        </a:effectStyle>
+        <a:effectStyle>
+          <a:effectLst/>
+        </a:effectStyle>
+        <a:effectStyle>
+          <a:effectLst>
+            <a:outerShdw blurRad="57150" dist="19050" dir="5400000" algn="ctr" rotWithShape="0">
+              <a:srgbClr val="000000">
+                <a:alpha val="63000"/>
+              </a:srgbClr>
+            </a:outerShdw>
+          </a:effectLst>
+        </a:effectStyle>
+      </a:effectStyleLst>
+      <a:bgFillStyleLst>
+        <a:solidFill>
+          <a:schemeClr val="phClr"/>
+        </a:solidFill>
+        <a:solidFill>
+          <a:schemeClr val="phClr">
+            <a:tint val="95000"/>
+            <a:satMod val="170000"/>
+          </a:schemeClr>
+        </a:solidFill>
+        <a:gradFill rotWithShape="1">
+          <a:gsLst>
+            <a:gs pos="0">
+              <a:schemeClr val="phClr">
+                <a:tint val="93000"/>
+                <a:satMod val="150000"/>
+                <a:shade val="98000"/>
+                <a:lumMod val="102000"/>
+              </a:schemeClr>
+            </a:gs>
+            <a:gs pos="50000">
+              <a:schemeClr val="phClr">
+                <a:tint val="98000"/>
+                <a:satMod val="130000"/>
+                <a:shade val="90000"/>
+                <a:lumMod val="103000"/>
+              </a:schemeClr>
+            </a:gs>
+            <a:gs pos="100000">
+              <a:schemeClr val="phClr">
+                <a:shade val="63000"/>
+                <a:satMod val="120000"/>
+              </a:schemeClr>
+            </a:gs>
+          </a:gsLst>
+          <a:lin ang="5400000" scaled="0"/>
+        </a:gradFill>
+      </a:bgFillStyleLst>
+    </a:fmtScheme>
+  </a:themeElements>
+  <a:objectDefaults/>
+  <a:extraClrSchemeLst/>
+  <a:extLst>
+    <a:ext uri="{05A4C25C-085E-4340-85A3-A5531E510DB2}">
+      <thm15:themeFamily xmlns:thm15="http://schemas.microsoft.com/office/thememl/2012/main" name="Office Theme" id="{62F939B6-93AF-4DB8-9C6B-D6C7DFDC589F}" vid="{4A3C46E8-61CC-4603-A589-7422A47A8E4A}"/>
+    </a:ext>
+  </a:extLst>
+</a:theme>
 </file>
</xml_diff>